<commit_message>
updated doc and pptx
</commit_message>
<xml_diff>
--- a/Dirtyc0w/CVE-2016-5195.pptx
+++ b/Dirtyc0w/CVE-2016-5195.pptx
@@ -4,10 +4,22 @@
   <p:sldMasterIdLst>
     <p:sldMasterId id="2147483648" r:id="rId1"/>
   </p:sldMasterIdLst>
+  <p:notesMasterIdLst>
+    <p:notesMasterId r:id="rId14"/>
+  </p:notesMasterIdLst>
   <p:sldIdLst>
     <p:sldId id="256" r:id="rId2"/>
-    <p:sldId id="257" r:id="rId3"/>
-    <p:sldId id="258" r:id="rId4"/>
+    <p:sldId id="269" r:id="rId3"/>
+    <p:sldId id="257" r:id="rId4"/>
+    <p:sldId id="258" r:id="rId5"/>
+    <p:sldId id="261" r:id="rId6"/>
+    <p:sldId id="262" r:id="rId7"/>
+    <p:sldId id="263" r:id="rId8"/>
+    <p:sldId id="264" r:id="rId9"/>
+    <p:sldId id="265" r:id="rId10"/>
+    <p:sldId id="266" r:id="rId11"/>
+    <p:sldId id="267" r:id="rId12"/>
+    <p:sldId id="268" r:id="rId13"/>
   </p:sldIdLst>
   <p:sldSz cx="12192000" cy="6858000"/>
   <p:notesSz cx="6858000" cy="9144000"/>
@@ -106,7 +118,1958 @@
       </a:defRPr>
     </a:lvl9pPr>
   </p:defaultTextStyle>
+  <p:extLst>
+    <p:ext uri="{EFAFB233-063F-42B5-8137-9DF3F51BA10A}">
+      <p15:sldGuideLst xmlns:p15="http://schemas.microsoft.com/office/powerpoint/2012/main"/>
+    </p:ext>
+  </p:extLst>
 </p:presentation>
+</file>
+
+<file path=ppt/notesMasters/notesMaster1.xml><?xml version="1.0" encoding="utf-8"?>
+<p:notesMaster xmlns:a="http://schemas.openxmlformats.org/drawingml/2006/main" xmlns:r="http://schemas.openxmlformats.org/officeDocument/2006/relationships" xmlns:p="http://schemas.openxmlformats.org/presentationml/2006/main">
+  <p:cSld>
+    <p:bg>
+      <p:bgRef idx="1001">
+        <a:schemeClr val="bg1"/>
+      </p:bgRef>
+    </p:bg>
+    <p:spTree>
+      <p:nvGrpSpPr>
+        <p:cNvPr id="1" name=""/>
+        <p:cNvGrpSpPr/>
+        <p:nvPr/>
+      </p:nvGrpSpPr>
+      <p:grpSpPr>
+        <a:xfrm>
+          <a:off x="0" y="0"/>
+          <a:ext cx="0" cy="0"/>
+          <a:chOff x="0" y="0"/>
+          <a:chExt cx="0" cy="0"/>
+        </a:xfrm>
+      </p:grpSpPr>
+      <p:sp>
+        <p:nvSpPr>
+          <p:cNvPr id="2" name="מציין מיקום של כותרת עליונה 1"/>
+          <p:cNvSpPr>
+            <a:spLocks noGrp="1"/>
+          </p:cNvSpPr>
+          <p:nvPr>
+            <p:ph type="hdr" sz="quarter"/>
+          </p:nvPr>
+        </p:nvSpPr>
+        <p:spPr>
+          <a:xfrm>
+            <a:off x="3886200" y="0"/>
+            <a:ext cx="2971800" cy="458788"/>
+          </a:xfrm>
+          <a:prstGeom prst="rect">
+            <a:avLst/>
+          </a:prstGeom>
+        </p:spPr>
+        <p:txBody>
+          <a:bodyPr vert="horz" lIns="91440" tIns="45720" rIns="91440" bIns="45720" rtlCol="1"/>
+          <a:lstStyle>
+            <a:lvl1pPr algn="l">
+              <a:defRPr sz="1200"/>
+            </a:lvl1pPr>
+          </a:lstStyle>
+          <a:p>
+            <a:endParaRPr lang="en-US"/>
+          </a:p>
+        </p:txBody>
+      </p:sp>
+      <p:sp>
+        <p:nvSpPr>
+          <p:cNvPr id="3" name="מציין מיקום של תאריך 2"/>
+          <p:cNvSpPr>
+            <a:spLocks noGrp="1"/>
+          </p:cNvSpPr>
+          <p:nvPr>
+            <p:ph type="dt" idx="1"/>
+          </p:nvPr>
+        </p:nvSpPr>
+        <p:spPr>
+          <a:xfrm>
+            <a:off x="1588" y="0"/>
+            <a:ext cx="2971800" cy="458788"/>
+          </a:xfrm>
+          <a:prstGeom prst="rect">
+            <a:avLst/>
+          </a:prstGeom>
+        </p:spPr>
+        <p:txBody>
+          <a:bodyPr vert="horz" lIns="91440" tIns="45720" rIns="91440" bIns="45720" rtlCol="1"/>
+          <a:lstStyle>
+            <a:lvl1pPr algn="r">
+              <a:defRPr sz="1200"/>
+            </a:lvl1pPr>
+          </a:lstStyle>
+          <a:p>
+            <a:fld id="{05C18085-A1AD-41F2-84D6-5B500135F331}" type="datetimeFigureOut">
+              <a:rPr lang="en-US" smtClean="0"/>
+              <a:t>1/3/2022</a:t>
+            </a:fld>
+            <a:endParaRPr lang="en-US"/>
+          </a:p>
+        </p:txBody>
+      </p:sp>
+      <p:sp>
+        <p:nvSpPr>
+          <p:cNvPr id="4" name="מציין מיקום של תמונת שקופית 3"/>
+          <p:cNvSpPr>
+            <a:spLocks noGrp="1" noRot="1" noChangeAspect="1"/>
+          </p:cNvSpPr>
+          <p:nvPr>
+            <p:ph type="sldImg" idx="2"/>
+          </p:nvPr>
+        </p:nvSpPr>
+        <p:spPr>
+          <a:xfrm>
+            <a:off x="685800" y="1143000"/>
+            <a:ext cx="5486400" cy="3086100"/>
+          </a:xfrm>
+          <a:prstGeom prst="rect">
+            <a:avLst/>
+          </a:prstGeom>
+          <a:noFill/>
+          <a:ln w="12700">
+            <a:solidFill>
+              <a:prstClr val="black"/>
+            </a:solidFill>
+          </a:ln>
+        </p:spPr>
+        <p:txBody>
+          <a:bodyPr vert="horz" lIns="91440" tIns="45720" rIns="91440" bIns="45720" rtlCol="1" anchor="ctr"/>
+          <a:lstStyle/>
+          <a:p>
+            <a:endParaRPr lang="en-US"/>
+          </a:p>
+        </p:txBody>
+      </p:sp>
+      <p:sp>
+        <p:nvSpPr>
+          <p:cNvPr id="5" name="מציין מיקום של הערות 4"/>
+          <p:cNvSpPr>
+            <a:spLocks noGrp="1"/>
+          </p:cNvSpPr>
+          <p:nvPr>
+            <p:ph type="body" sz="quarter" idx="3"/>
+          </p:nvPr>
+        </p:nvSpPr>
+        <p:spPr>
+          <a:xfrm>
+            <a:off x="685800" y="4400550"/>
+            <a:ext cx="5486400" cy="3600450"/>
+          </a:xfrm>
+          <a:prstGeom prst="rect">
+            <a:avLst/>
+          </a:prstGeom>
+        </p:spPr>
+        <p:txBody>
+          <a:bodyPr vert="horz" lIns="91440" tIns="45720" rIns="91440" bIns="45720" rtlCol="1"/>
+          <a:lstStyle/>
+          <a:p>
+            <a:pPr lvl="0"/>
+            <a:r>
+              <a:rPr lang="he-IL"/>
+              <a:t>ערוך סגנונות טקסט של תבנית בסיס</a:t>
+            </a:r>
+          </a:p>
+          <a:p>
+            <a:pPr lvl="1"/>
+            <a:r>
+              <a:rPr lang="he-IL"/>
+              <a:t>רמה שניה</a:t>
+            </a:r>
+          </a:p>
+          <a:p>
+            <a:pPr lvl="2"/>
+            <a:r>
+              <a:rPr lang="he-IL"/>
+              <a:t>רמה שלישית</a:t>
+            </a:r>
+          </a:p>
+          <a:p>
+            <a:pPr lvl="3"/>
+            <a:r>
+              <a:rPr lang="he-IL"/>
+              <a:t>רמה רביעית</a:t>
+            </a:r>
+          </a:p>
+          <a:p>
+            <a:pPr lvl="4"/>
+            <a:r>
+              <a:rPr lang="he-IL"/>
+              <a:t>רמה חמישית</a:t>
+            </a:r>
+            <a:endParaRPr lang="en-US"/>
+          </a:p>
+        </p:txBody>
+      </p:sp>
+      <p:sp>
+        <p:nvSpPr>
+          <p:cNvPr id="6" name="מציין מיקום של כותרת תחתונה 5"/>
+          <p:cNvSpPr>
+            <a:spLocks noGrp="1"/>
+          </p:cNvSpPr>
+          <p:nvPr>
+            <p:ph type="ftr" sz="quarter" idx="4"/>
+          </p:nvPr>
+        </p:nvSpPr>
+        <p:spPr>
+          <a:xfrm>
+            <a:off x="3886200" y="8685213"/>
+            <a:ext cx="2971800" cy="458787"/>
+          </a:xfrm>
+          <a:prstGeom prst="rect">
+            <a:avLst/>
+          </a:prstGeom>
+        </p:spPr>
+        <p:txBody>
+          <a:bodyPr vert="horz" lIns="91440" tIns="45720" rIns="91440" bIns="45720" rtlCol="1" anchor="b"/>
+          <a:lstStyle>
+            <a:lvl1pPr algn="l">
+              <a:defRPr sz="1200"/>
+            </a:lvl1pPr>
+          </a:lstStyle>
+          <a:p>
+            <a:endParaRPr lang="en-US"/>
+          </a:p>
+        </p:txBody>
+      </p:sp>
+      <p:sp>
+        <p:nvSpPr>
+          <p:cNvPr id="7" name="מציין מיקום של מספר שקופית 6"/>
+          <p:cNvSpPr>
+            <a:spLocks noGrp="1"/>
+          </p:cNvSpPr>
+          <p:nvPr>
+            <p:ph type="sldNum" sz="quarter" idx="5"/>
+          </p:nvPr>
+        </p:nvSpPr>
+        <p:spPr>
+          <a:xfrm>
+            <a:off x="1588" y="8685213"/>
+            <a:ext cx="2971800" cy="458787"/>
+          </a:xfrm>
+          <a:prstGeom prst="rect">
+            <a:avLst/>
+          </a:prstGeom>
+        </p:spPr>
+        <p:txBody>
+          <a:bodyPr vert="horz" lIns="91440" tIns="45720" rIns="91440" bIns="45720" rtlCol="1" anchor="b"/>
+          <a:lstStyle>
+            <a:lvl1pPr algn="r">
+              <a:defRPr sz="1200"/>
+            </a:lvl1pPr>
+          </a:lstStyle>
+          <a:p>
+            <a:fld id="{C02DE9E0-C07F-48D7-94F8-678723A87F5D}" type="slidenum">
+              <a:rPr lang="en-US" smtClean="0"/>
+              <a:t>‹#›</a:t>
+            </a:fld>
+            <a:endParaRPr lang="en-US"/>
+          </a:p>
+        </p:txBody>
+      </p:sp>
+    </p:spTree>
+    <p:extLst>
+      <p:ext uri="{BB962C8B-B14F-4D97-AF65-F5344CB8AC3E}">
+        <p14:creationId xmlns:p14="http://schemas.microsoft.com/office/powerpoint/2010/main" val="1546697481"/>
+      </p:ext>
+    </p:extLst>
+  </p:cSld>
+  <p:clrMap bg1="lt1" tx1="dk1" bg2="lt2" tx2="dk2" accent1="accent1" accent2="accent2" accent3="accent3" accent4="accent4" accent5="accent5" accent6="accent6" hlink="hlink" folHlink="folHlink"/>
+  <p:notesStyle>
+    <a:lvl1pPr marL="0" algn="r" defTabSz="914400" rtl="1" eaLnBrk="1" latinLnBrk="0" hangingPunct="1">
+      <a:defRPr sz="1200" kern="1200">
+        <a:solidFill>
+          <a:schemeClr val="tx1"/>
+        </a:solidFill>
+        <a:latin typeface="+mn-lt"/>
+        <a:ea typeface="+mn-ea"/>
+        <a:cs typeface="+mn-cs"/>
+      </a:defRPr>
+    </a:lvl1pPr>
+    <a:lvl2pPr marL="457200" algn="r" defTabSz="914400" rtl="1" eaLnBrk="1" latinLnBrk="0" hangingPunct="1">
+      <a:defRPr sz="1200" kern="1200">
+        <a:solidFill>
+          <a:schemeClr val="tx1"/>
+        </a:solidFill>
+        <a:latin typeface="+mn-lt"/>
+        <a:ea typeface="+mn-ea"/>
+        <a:cs typeface="+mn-cs"/>
+      </a:defRPr>
+    </a:lvl2pPr>
+    <a:lvl3pPr marL="914400" algn="r" defTabSz="914400" rtl="1" eaLnBrk="1" latinLnBrk="0" hangingPunct="1">
+      <a:defRPr sz="1200" kern="1200">
+        <a:solidFill>
+          <a:schemeClr val="tx1"/>
+        </a:solidFill>
+        <a:latin typeface="+mn-lt"/>
+        <a:ea typeface="+mn-ea"/>
+        <a:cs typeface="+mn-cs"/>
+      </a:defRPr>
+    </a:lvl3pPr>
+    <a:lvl4pPr marL="1371600" algn="r" defTabSz="914400" rtl="1" eaLnBrk="1" latinLnBrk="0" hangingPunct="1">
+      <a:defRPr sz="1200" kern="1200">
+        <a:solidFill>
+          <a:schemeClr val="tx1"/>
+        </a:solidFill>
+        <a:latin typeface="+mn-lt"/>
+        <a:ea typeface="+mn-ea"/>
+        <a:cs typeface="+mn-cs"/>
+      </a:defRPr>
+    </a:lvl4pPr>
+    <a:lvl5pPr marL="1828800" algn="r" defTabSz="914400" rtl="1" eaLnBrk="1" latinLnBrk="0" hangingPunct="1">
+      <a:defRPr sz="1200" kern="1200">
+        <a:solidFill>
+          <a:schemeClr val="tx1"/>
+        </a:solidFill>
+        <a:latin typeface="+mn-lt"/>
+        <a:ea typeface="+mn-ea"/>
+        <a:cs typeface="+mn-cs"/>
+      </a:defRPr>
+    </a:lvl5pPr>
+    <a:lvl6pPr marL="2286000" algn="r" defTabSz="914400" rtl="1" eaLnBrk="1" latinLnBrk="0" hangingPunct="1">
+      <a:defRPr sz="1200" kern="1200">
+        <a:solidFill>
+          <a:schemeClr val="tx1"/>
+        </a:solidFill>
+        <a:latin typeface="+mn-lt"/>
+        <a:ea typeface="+mn-ea"/>
+        <a:cs typeface="+mn-cs"/>
+      </a:defRPr>
+    </a:lvl6pPr>
+    <a:lvl7pPr marL="2743200" algn="r" defTabSz="914400" rtl="1" eaLnBrk="1" latinLnBrk="0" hangingPunct="1">
+      <a:defRPr sz="1200" kern="1200">
+        <a:solidFill>
+          <a:schemeClr val="tx1"/>
+        </a:solidFill>
+        <a:latin typeface="+mn-lt"/>
+        <a:ea typeface="+mn-ea"/>
+        <a:cs typeface="+mn-cs"/>
+      </a:defRPr>
+    </a:lvl7pPr>
+    <a:lvl8pPr marL="3200400" algn="r" defTabSz="914400" rtl="1" eaLnBrk="1" latinLnBrk="0" hangingPunct="1">
+      <a:defRPr sz="1200" kern="1200">
+        <a:solidFill>
+          <a:schemeClr val="tx1"/>
+        </a:solidFill>
+        <a:latin typeface="+mn-lt"/>
+        <a:ea typeface="+mn-ea"/>
+        <a:cs typeface="+mn-cs"/>
+      </a:defRPr>
+    </a:lvl8pPr>
+    <a:lvl9pPr marL="3657600" algn="r" defTabSz="914400" rtl="1" eaLnBrk="1" latinLnBrk="0" hangingPunct="1">
+      <a:defRPr sz="1200" kern="1200">
+        <a:solidFill>
+          <a:schemeClr val="tx1"/>
+        </a:solidFill>
+        <a:latin typeface="+mn-lt"/>
+        <a:ea typeface="+mn-ea"/>
+        <a:cs typeface="+mn-cs"/>
+      </a:defRPr>
+    </a:lvl9pPr>
+  </p:notesStyle>
+</p:notesMaster>
+</file>
+
+<file path=ppt/notesSlides/notesSlide1.xml><?xml version="1.0" encoding="utf-8"?>
+<p:notes xmlns:a="http://schemas.openxmlformats.org/drawingml/2006/main" xmlns:r="http://schemas.openxmlformats.org/officeDocument/2006/relationships" xmlns:p="http://schemas.openxmlformats.org/presentationml/2006/main">
+  <p:cSld>
+    <p:spTree>
+      <p:nvGrpSpPr>
+        <p:cNvPr id="1" name=""/>
+        <p:cNvGrpSpPr/>
+        <p:nvPr/>
+      </p:nvGrpSpPr>
+      <p:grpSpPr>
+        <a:xfrm>
+          <a:off x="0" y="0"/>
+          <a:ext cx="0" cy="0"/>
+          <a:chOff x="0" y="0"/>
+          <a:chExt cx="0" cy="0"/>
+        </a:xfrm>
+      </p:grpSpPr>
+      <p:sp>
+        <p:nvSpPr>
+          <p:cNvPr id="2" name="מציין מיקום של תמונת שקופית 1"/>
+          <p:cNvSpPr>
+            <a:spLocks noGrp="1" noRot="1" noChangeAspect="1"/>
+          </p:cNvSpPr>
+          <p:nvPr>
+            <p:ph type="sldImg"/>
+          </p:nvPr>
+        </p:nvSpPr>
+        <p:spPr/>
+      </p:sp>
+      <p:sp>
+        <p:nvSpPr>
+          <p:cNvPr id="3" name="מציין מיקום של הערות 2"/>
+          <p:cNvSpPr>
+            <a:spLocks noGrp="1"/>
+          </p:cNvSpPr>
+          <p:nvPr>
+            <p:ph type="body" idx="1"/>
+          </p:nvPr>
+        </p:nvSpPr>
+        <p:spPr/>
+        <p:txBody>
+          <a:bodyPr/>
+          <a:lstStyle/>
+          <a:p>
+            <a:pPr marL="0" marR="0" lvl="0" indent="0" algn="r" defTabSz="914400" rtl="1" eaLnBrk="1" fontAlgn="auto" latinLnBrk="0" hangingPunct="1">
+              <a:lnSpc>
+                <a:spcPct val="100000"/>
+              </a:lnSpc>
+              <a:spcBef>
+                <a:spcPts val="0"/>
+              </a:spcBef>
+              <a:spcAft>
+                <a:spcPts val="0"/>
+              </a:spcAft>
+              <a:buClrTx/>
+              <a:buSzTx/>
+              <a:buFontTx/>
+              <a:buNone/>
+              <a:tabLst/>
+              <a:defRPr/>
+            </a:pPr>
+            <a:r>
+              <a:rPr lang="he-IL" sz="1200" kern="1200" dirty="0">
+                <a:solidFill>
+                  <a:schemeClr val="tx1"/>
+                </a:solidFill>
+                <a:effectLst/>
+                <a:latin typeface="+mn-lt"/>
+                <a:ea typeface="+mn-ea"/>
+                <a:cs typeface="+mn-cs"/>
+              </a:rPr>
+              <a:t>אני אתחיל את הסקירה בהסבר לגבי כמה מושגים בסיסיים, ואז אעבור על קטע קוד שמנצל את החולשה ואסביר עליו. אם בכל שלב יש לכם שאלות אתם מוזמנים להרים את היד ואשתדל לענות כמה שיותר.</a:t>
+            </a:r>
+            <a:endParaRPr lang="en-US" sz="1200" kern="1200" dirty="0">
+              <a:solidFill>
+                <a:schemeClr val="tx1"/>
+              </a:solidFill>
+              <a:effectLst/>
+              <a:latin typeface="+mn-lt"/>
+              <a:ea typeface="+mn-ea"/>
+              <a:cs typeface="+mn-cs"/>
+            </a:endParaRPr>
+          </a:p>
+          <a:p>
+            <a:endParaRPr lang="en-US" dirty="0"/>
+          </a:p>
+        </p:txBody>
+      </p:sp>
+      <p:sp>
+        <p:nvSpPr>
+          <p:cNvPr id="4" name="מציין מיקום של מספר שקופית 3"/>
+          <p:cNvSpPr>
+            <a:spLocks noGrp="1"/>
+          </p:cNvSpPr>
+          <p:nvPr>
+            <p:ph type="sldNum" sz="quarter" idx="10"/>
+          </p:nvPr>
+        </p:nvSpPr>
+        <p:spPr/>
+        <p:txBody>
+          <a:bodyPr/>
+          <a:lstStyle/>
+          <a:p>
+            <a:fld id="{C02DE9E0-C07F-48D7-94F8-678723A87F5D}" type="slidenum">
+              <a:rPr lang="en-US" smtClean="0"/>
+              <a:t>1</a:t>
+            </a:fld>
+            <a:endParaRPr lang="en-US"/>
+          </a:p>
+        </p:txBody>
+      </p:sp>
+    </p:spTree>
+    <p:extLst>
+      <p:ext uri="{BB962C8B-B14F-4D97-AF65-F5344CB8AC3E}">
+        <p14:creationId xmlns:p14="http://schemas.microsoft.com/office/powerpoint/2010/main" val="3340568978"/>
+      </p:ext>
+    </p:extLst>
+  </p:cSld>
+  <p:clrMapOvr>
+    <a:masterClrMapping/>
+  </p:clrMapOvr>
+</p:notes>
+</file>
+
+<file path=ppt/notesSlides/notesSlide10.xml><?xml version="1.0" encoding="utf-8"?>
+<p:notes xmlns:a="http://schemas.openxmlformats.org/drawingml/2006/main" xmlns:r="http://schemas.openxmlformats.org/officeDocument/2006/relationships" xmlns:p="http://schemas.openxmlformats.org/presentationml/2006/main">
+  <p:cSld>
+    <p:spTree>
+      <p:nvGrpSpPr>
+        <p:cNvPr id="1" name=""/>
+        <p:cNvGrpSpPr/>
+        <p:nvPr/>
+      </p:nvGrpSpPr>
+      <p:grpSpPr>
+        <a:xfrm>
+          <a:off x="0" y="0"/>
+          <a:ext cx="0" cy="0"/>
+          <a:chOff x="0" y="0"/>
+          <a:chExt cx="0" cy="0"/>
+        </a:xfrm>
+      </p:grpSpPr>
+      <p:sp>
+        <p:nvSpPr>
+          <p:cNvPr id="2" name="מציין מיקום של תמונת שקופית 1"/>
+          <p:cNvSpPr>
+            <a:spLocks noGrp="1" noRot="1" noChangeAspect="1"/>
+          </p:cNvSpPr>
+          <p:nvPr>
+            <p:ph type="sldImg"/>
+          </p:nvPr>
+        </p:nvSpPr>
+        <p:spPr/>
+      </p:sp>
+      <p:sp>
+        <p:nvSpPr>
+          <p:cNvPr id="3" name="מציין מיקום של הערות 2"/>
+          <p:cNvSpPr>
+            <a:spLocks noGrp="1"/>
+          </p:cNvSpPr>
+          <p:nvPr>
+            <p:ph type="body" idx="1"/>
+          </p:nvPr>
+        </p:nvSpPr>
+        <p:spPr/>
+        <p:txBody>
+          <a:bodyPr/>
+          <a:lstStyle/>
+          <a:p>
+            <a:pPr rtl="1"/>
+            <a:r>
+              <a:rPr lang="he-IL" sz="1200" kern="1200" dirty="0">
+                <a:solidFill>
+                  <a:schemeClr val="tx1"/>
+                </a:solidFill>
+                <a:effectLst/>
+                <a:latin typeface="+mn-lt"/>
+                <a:ea typeface="+mn-ea"/>
+                <a:cs typeface="+mn-cs"/>
+              </a:rPr>
+              <a:t>זו הפונקציה הראשונה. היא דואגת לפתוח את הקובץ </a:t>
+            </a:r>
+            <a:r>
+              <a:rPr lang="en-US" sz="1200" kern="1200" dirty="0">
+                <a:solidFill>
+                  <a:schemeClr val="tx1"/>
+                </a:solidFill>
+                <a:effectLst/>
+                <a:latin typeface="+mn-lt"/>
+                <a:ea typeface="+mn-ea"/>
+                <a:cs typeface="+mn-cs"/>
+              </a:rPr>
+              <a:t>/proc/self/mem</a:t>
+            </a:r>
+            <a:r>
+              <a:rPr lang="he-IL" sz="1200" kern="1200" dirty="0">
+                <a:solidFill>
+                  <a:schemeClr val="tx1"/>
+                </a:solidFill>
+                <a:effectLst/>
+                <a:latin typeface="+mn-lt"/>
+                <a:ea typeface="+mn-ea"/>
+                <a:cs typeface="+mn-cs"/>
+              </a:rPr>
+              <a:t> לכתיבה וקריאה. זה קובץ מיוחד במערכת הקבצים שמייצג את הזיכרון הווירטואלי של התהליך הנוכחי שרץ. שינוי שנעשה בקובץ הזה יתרחש בעצם על הזיכרון הווירטואלי של התהליך.</a:t>
+            </a:r>
+            <a:endParaRPr lang="en-US" sz="1200" kern="1200" dirty="0">
+              <a:solidFill>
+                <a:schemeClr val="tx1"/>
+              </a:solidFill>
+              <a:effectLst/>
+              <a:latin typeface="+mn-lt"/>
+              <a:ea typeface="+mn-ea"/>
+              <a:cs typeface="+mn-cs"/>
+            </a:endParaRPr>
+          </a:p>
+          <a:p>
+            <a:pPr rtl="1"/>
+            <a:r>
+              <a:rPr lang="he-IL" sz="1200" kern="1200" dirty="0">
+                <a:solidFill>
+                  <a:schemeClr val="tx1"/>
+                </a:solidFill>
+                <a:effectLst/>
+                <a:latin typeface="+mn-lt"/>
+                <a:ea typeface="+mn-ea"/>
+                <a:cs typeface="+mn-cs"/>
+              </a:rPr>
+              <a:t>לאחר מכן הפונקציה נכנסת ללולאה בה הוא מנסה כל הזמן לכתוב למיפוי של הקובץ שנוצר קודם. אפשר לראות כאן שבתוך הלולאה, נעשה </a:t>
+            </a:r>
+            <a:r>
+              <a:rPr lang="en-US" sz="1200" kern="1200" dirty="0">
+                <a:solidFill>
+                  <a:schemeClr val="tx1"/>
+                </a:solidFill>
+                <a:effectLst/>
+                <a:latin typeface="+mn-lt"/>
+                <a:ea typeface="+mn-ea"/>
+                <a:cs typeface="+mn-cs"/>
+              </a:rPr>
+              <a:t>seek</a:t>
+            </a:r>
+            <a:r>
+              <a:rPr lang="he-IL" sz="1200" kern="1200" dirty="0">
+                <a:solidFill>
+                  <a:schemeClr val="tx1"/>
+                </a:solidFill>
+                <a:effectLst/>
+                <a:latin typeface="+mn-lt"/>
+                <a:ea typeface="+mn-ea"/>
+                <a:cs typeface="+mn-cs"/>
+              </a:rPr>
+              <a:t> לכתובת של </a:t>
+            </a:r>
+            <a:r>
+              <a:rPr lang="en-US" sz="1200" kern="1200" dirty="0">
+                <a:solidFill>
+                  <a:schemeClr val="tx1"/>
+                </a:solidFill>
+                <a:effectLst/>
+                <a:latin typeface="+mn-lt"/>
+                <a:ea typeface="+mn-ea"/>
+                <a:cs typeface="+mn-cs"/>
+              </a:rPr>
+              <a:t>map </a:t>
+            </a:r>
+            <a:r>
+              <a:rPr lang="he-IL" sz="1200" kern="1200" dirty="0">
+                <a:solidFill>
+                  <a:schemeClr val="tx1"/>
+                </a:solidFill>
+                <a:effectLst/>
+                <a:latin typeface="+mn-lt"/>
+                <a:ea typeface="+mn-ea"/>
+                <a:cs typeface="+mn-cs"/>
+              </a:rPr>
+              <a:t>שהוא המיפוי הפרטי של הקובץ, ואז נכתב לתוכו התוכן. הכתיבה לכתובת בקובץ </a:t>
+            </a:r>
+            <a:r>
+              <a:rPr lang="en-US" sz="1200" kern="1200" dirty="0">
+                <a:solidFill>
+                  <a:schemeClr val="tx1"/>
+                </a:solidFill>
+                <a:effectLst/>
+                <a:latin typeface="+mn-lt"/>
+                <a:ea typeface="+mn-ea"/>
+                <a:cs typeface="+mn-cs"/>
+              </a:rPr>
+              <a:t>mem</a:t>
+            </a:r>
+            <a:r>
+              <a:rPr lang="he-IL" sz="1200" kern="1200" dirty="0">
+                <a:solidFill>
+                  <a:schemeClr val="tx1"/>
+                </a:solidFill>
+                <a:effectLst/>
+                <a:latin typeface="+mn-lt"/>
+                <a:ea typeface="+mn-ea"/>
+                <a:cs typeface="+mn-cs"/>
+              </a:rPr>
+              <a:t> שווה ערך לכתיבה ישירות למיפוי.</a:t>
+            </a:r>
+            <a:endParaRPr lang="en-US" sz="1200" kern="1200" dirty="0">
+              <a:solidFill>
+                <a:schemeClr val="tx1"/>
+              </a:solidFill>
+              <a:effectLst/>
+              <a:latin typeface="+mn-lt"/>
+              <a:ea typeface="+mn-ea"/>
+              <a:cs typeface="+mn-cs"/>
+            </a:endParaRPr>
+          </a:p>
+        </p:txBody>
+      </p:sp>
+      <p:sp>
+        <p:nvSpPr>
+          <p:cNvPr id="4" name="מציין מיקום של מספר שקופית 3"/>
+          <p:cNvSpPr>
+            <a:spLocks noGrp="1"/>
+          </p:cNvSpPr>
+          <p:nvPr>
+            <p:ph type="sldNum" sz="quarter" idx="10"/>
+          </p:nvPr>
+        </p:nvSpPr>
+        <p:spPr/>
+        <p:txBody>
+          <a:bodyPr/>
+          <a:lstStyle/>
+          <a:p>
+            <a:fld id="{C02DE9E0-C07F-48D7-94F8-678723A87F5D}" type="slidenum">
+              <a:rPr lang="en-US" smtClean="0"/>
+              <a:t>11</a:t>
+            </a:fld>
+            <a:endParaRPr lang="en-US"/>
+          </a:p>
+        </p:txBody>
+      </p:sp>
+    </p:spTree>
+    <p:extLst>
+      <p:ext uri="{BB962C8B-B14F-4D97-AF65-F5344CB8AC3E}">
+        <p14:creationId xmlns:p14="http://schemas.microsoft.com/office/powerpoint/2010/main" val="2529422099"/>
+      </p:ext>
+    </p:extLst>
+  </p:cSld>
+  <p:clrMapOvr>
+    <a:masterClrMapping/>
+  </p:clrMapOvr>
+</p:notes>
+</file>
+
+<file path=ppt/notesSlides/notesSlide11.xml><?xml version="1.0" encoding="utf-8"?>
+<p:notes xmlns:a="http://schemas.openxmlformats.org/drawingml/2006/main" xmlns:r="http://schemas.openxmlformats.org/officeDocument/2006/relationships" xmlns:p="http://schemas.openxmlformats.org/presentationml/2006/main">
+  <p:cSld>
+    <p:spTree>
+      <p:nvGrpSpPr>
+        <p:cNvPr id="1" name=""/>
+        <p:cNvGrpSpPr/>
+        <p:nvPr/>
+      </p:nvGrpSpPr>
+      <p:grpSpPr>
+        <a:xfrm>
+          <a:off x="0" y="0"/>
+          <a:ext cx="0" cy="0"/>
+          <a:chOff x="0" y="0"/>
+          <a:chExt cx="0" cy="0"/>
+        </a:xfrm>
+      </p:grpSpPr>
+      <p:sp>
+        <p:nvSpPr>
+          <p:cNvPr id="2" name="מציין מיקום של תמונת שקופית 1"/>
+          <p:cNvSpPr>
+            <a:spLocks noGrp="1" noRot="1" noChangeAspect="1"/>
+          </p:cNvSpPr>
+          <p:nvPr>
+            <p:ph type="sldImg"/>
+          </p:nvPr>
+        </p:nvSpPr>
+        <p:spPr/>
+      </p:sp>
+      <p:sp>
+        <p:nvSpPr>
+          <p:cNvPr id="3" name="מציין מיקום של הערות 2"/>
+          <p:cNvSpPr>
+            <a:spLocks noGrp="1"/>
+          </p:cNvSpPr>
+          <p:nvPr>
+            <p:ph type="body" idx="1"/>
+          </p:nvPr>
+        </p:nvSpPr>
+        <p:spPr/>
+        <p:txBody>
+          <a:bodyPr/>
+          <a:lstStyle/>
+          <a:p>
+            <a:pPr rtl="1"/>
+            <a:r>
+              <a:rPr lang="he-IL" sz="1200" kern="1200" dirty="0">
+                <a:solidFill>
+                  <a:schemeClr val="tx1"/>
+                </a:solidFill>
+                <a:effectLst/>
+                <a:latin typeface="+mn-lt"/>
+                <a:ea typeface="+mn-ea"/>
+                <a:cs typeface="+mn-cs"/>
+              </a:rPr>
+              <a:t>זו הפונקציה השנייה, היא קוראת בלולאה ל</a:t>
+            </a:r>
+            <a:r>
+              <a:rPr lang="en-US" sz="1200" kern="1200" dirty="0" err="1">
+                <a:solidFill>
+                  <a:schemeClr val="tx1"/>
+                </a:solidFill>
+                <a:effectLst/>
+                <a:latin typeface="+mn-lt"/>
+                <a:ea typeface="+mn-ea"/>
+                <a:cs typeface="+mn-cs"/>
+              </a:rPr>
+              <a:t>syscall</a:t>
+            </a:r>
+            <a:r>
+              <a:rPr lang="he-IL" sz="1200" kern="1200" dirty="0">
+                <a:solidFill>
+                  <a:schemeClr val="tx1"/>
+                </a:solidFill>
+                <a:effectLst/>
+                <a:latin typeface="+mn-lt"/>
+                <a:ea typeface="+mn-ea"/>
+                <a:cs typeface="+mn-cs"/>
+              </a:rPr>
+              <a:t> – </a:t>
+            </a:r>
+            <a:r>
+              <a:rPr lang="en-US" sz="1200" kern="1200" dirty="0" err="1">
+                <a:solidFill>
+                  <a:schemeClr val="tx1"/>
+                </a:solidFill>
+                <a:effectLst/>
+                <a:latin typeface="+mn-lt"/>
+                <a:ea typeface="+mn-ea"/>
+                <a:cs typeface="+mn-cs"/>
+              </a:rPr>
+              <a:t>madvice</a:t>
+            </a:r>
+            <a:r>
+              <a:rPr lang="he-IL" sz="1200" kern="1200" dirty="0">
+                <a:solidFill>
+                  <a:schemeClr val="tx1"/>
+                </a:solidFill>
+                <a:effectLst/>
+                <a:latin typeface="+mn-lt"/>
+                <a:ea typeface="+mn-ea"/>
+                <a:cs typeface="+mn-cs"/>
+              </a:rPr>
+              <a:t> עם הגדל </a:t>
+            </a:r>
+            <a:r>
+              <a:rPr lang="en-US" sz="1200" kern="1200" dirty="0">
+                <a:solidFill>
+                  <a:schemeClr val="tx1"/>
+                </a:solidFill>
+                <a:effectLst/>
+                <a:latin typeface="+mn-lt"/>
+                <a:ea typeface="+mn-ea"/>
+                <a:cs typeface="+mn-cs"/>
+              </a:rPr>
+              <a:t>MADV_DONTNEED</a:t>
+            </a:r>
+            <a:r>
+              <a:rPr lang="he-IL" sz="1200" kern="1200" dirty="0">
+                <a:solidFill>
+                  <a:schemeClr val="tx1"/>
+                </a:solidFill>
+                <a:effectLst/>
+                <a:latin typeface="+mn-lt"/>
+                <a:ea typeface="+mn-ea"/>
+                <a:cs typeface="+mn-cs"/>
+              </a:rPr>
+              <a:t>. ה</a:t>
+            </a:r>
+            <a:r>
+              <a:rPr lang="en-US" sz="1200" kern="1200" dirty="0" err="1">
+                <a:solidFill>
+                  <a:schemeClr val="tx1"/>
+                </a:solidFill>
+                <a:effectLst/>
+                <a:latin typeface="+mn-lt"/>
+                <a:ea typeface="+mn-ea"/>
+                <a:cs typeface="+mn-cs"/>
+              </a:rPr>
+              <a:t>syscall</a:t>
+            </a:r>
+            <a:r>
+              <a:rPr lang="he-IL" sz="1200" kern="1200" dirty="0">
+                <a:solidFill>
+                  <a:schemeClr val="tx1"/>
+                </a:solidFill>
+                <a:effectLst/>
+                <a:latin typeface="+mn-lt"/>
+                <a:ea typeface="+mn-ea"/>
+                <a:cs typeface="+mn-cs"/>
+              </a:rPr>
+              <a:t> הזה מודיע שאין יותר צורך בעותק הפרטי ומשנה את המיפוי חזרה לקובץ המקורי בזיכרון.</a:t>
+            </a:r>
+            <a:endParaRPr lang="en-US" sz="1200" kern="1200" dirty="0">
+              <a:solidFill>
+                <a:schemeClr val="tx1"/>
+              </a:solidFill>
+              <a:effectLst/>
+              <a:latin typeface="+mn-lt"/>
+              <a:ea typeface="+mn-ea"/>
+              <a:cs typeface="+mn-cs"/>
+            </a:endParaRPr>
+          </a:p>
+        </p:txBody>
+      </p:sp>
+      <p:sp>
+        <p:nvSpPr>
+          <p:cNvPr id="4" name="מציין מיקום של מספר שקופית 3"/>
+          <p:cNvSpPr>
+            <a:spLocks noGrp="1"/>
+          </p:cNvSpPr>
+          <p:nvPr>
+            <p:ph type="sldNum" sz="quarter" idx="10"/>
+          </p:nvPr>
+        </p:nvSpPr>
+        <p:spPr/>
+        <p:txBody>
+          <a:bodyPr/>
+          <a:lstStyle/>
+          <a:p>
+            <a:fld id="{C02DE9E0-C07F-48D7-94F8-678723A87F5D}" type="slidenum">
+              <a:rPr lang="en-US" smtClean="0"/>
+              <a:t>12</a:t>
+            </a:fld>
+            <a:endParaRPr lang="en-US"/>
+          </a:p>
+        </p:txBody>
+      </p:sp>
+    </p:spTree>
+    <p:extLst>
+      <p:ext uri="{BB962C8B-B14F-4D97-AF65-F5344CB8AC3E}">
+        <p14:creationId xmlns:p14="http://schemas.microsoft.com/office/powerpoint/2010/main" val="2304902657"/>
+      </p:ext>
+    </p:extLst>
+  </p:cSld>
+  <p:clrMapOvr>
+    <a:masterClrMapping/>
+  </p:clrMapOvr>
+</p:notes>
+</file>
+
+<file path=ppt/notesSlides/notesSlide2.xml><?xml version="1.0" encoding="utf-8"?>
+<p:notes xmlns:a="http://schemas.openxmlformats.org/drawingml/2006/main" xmlns:r="http://schemas.openxmlformats.org/officeDocument/2006/relationships" xmlns:p="http://schemas.openxmlformats.org/presentationml/2006/main">
+  <p:cSld>
+    <p:spTree>
+      <p:nvGrpSpPr>
+        <p:cNvPr id="1" name=""/>
+        <p:cNvGrpSpPr/>
+        <p:nvPr/>
+      </p:nvGrpSpPr>
+      <p:grpSpPr>
+        <a:xfrm>
+          <a:off x="0" y="0"/>
+          <a:ext cx="0" cy="0"/>
+          <a:chOff x="0" y="0"/>
+          <a:chExt cx="0" cy="0"/>
+        </a:xfrm>
+      </p:grpSpPr>
+      <p:sp>
+        <p:nvSpPr>
+          <p:cNvPr id="2" name="מציין מיקום של תמונת שקופית 1"/>
+          <p:cNvSpPr>
+            <a:spLocks noGrp="1" noRot="1" noChangeAspect="1"/>
+          </p:cNvSpPr>
+          <p:nvPr>
+            <p:ph type="sldImg"/>
+          </p:nvPr>
+        </p:nvSpPr>
+        <p:spPr/>
+      </p:sp>
+      <p:sp>
+        <p:nvSpPr>
+          <p:cNvPr id="3" name="מציין מיקום של הערות 2"/>
+          <p:cNvSpPr>
+            <a:spLocks noGrp="1"/>
+          </p:cNvSpPr>
+          <p:nvPr>
+            <p:ph type="body" idx="1"/>
+          </p:nvPr>
+        </p:nvSpPr>
+        <p:spPr/>
+        <p:txBody>
+          <a:bodyPr/>
+          <a:lstStyle/>
+          <a:p>
+            <a:pPr marL="0" marR="0" lvl="0" indent="0" algn="r" defTabSz="914400" rtl="1" eaLnBrk="1" fontAlgn="auto" latinLnBrk="0" hangingPunct="1">
+              <a:lnSpc>
+                <a:spcPct val="100000"/>
+              </a:lnSpc>
+              <a:spcBef>
+                <a:spcPts val="0"/>
+              </a:spcBef>
+              <a:spcAft>
+                <a:spcPts val="0"/>
+              </a:spcAft>
+              <a:buClrTx/>
+              <a:buSzTx/>
+              <a:buFontTx/>
+              <a:buNone/>
+              <a:tabLst/>
+              <a:defRPr/>
+            </a:pPr>
+            <a:r>
+              <a:rPr lang="he-IL" sz="1200" kern="1200" dirty="0">
+                <a:solidFill>
+                  <a:schemeClr val="tx1"/>
+                </a:solidFill>
+                <a:effectLst/>
+                <a:latin typeface="+mn-lt"/>
+                <a:ea typeface="+mn-ea"/>
+                <a:cs typeface="+mn-cs"/>
+              </a:rPr>
+              <a:t>ארחיב קצת על </a:t>
+            </a:r>
+            <a:r>
+              <a:rPr lang="en-US" sz="1200" kern="1200" dirty="0">
+                <a:solidFill>
+                  <a:schemeClr val="tx1"/>
+                </a:solidFill>
+                <a:effectLst/>
+                <a:latin typeface="+mn-lt"/>
+                <a:ea typeface="+mn-ea"/>
+                <a:cs typeface="+mn-cs"/>
+              </a:rPr>
+              <a:t>COW</a:t>
+            </a:r>
+            <a:r>
+              <a:rPr lang="he-IL" sz="1200" kern="1200" dirty="0">
+                <a:solidFill>
+                  <a:schemeClr val="tx1"/>
+                </a:solidFill>
+                <a:effectLst/>
+                <a:latin typeface="+mn-lt"/>
+                <a:ea typeface="+mn-ea"/>
+                <a:cs typeface="+mn-cs"/>
+              </a:rPr>
+              <a:t> לפני שאמשיך. נגיד וטעון לי קובץ חשוב לזיכרון בהרשאות קריאה בלבד.</a:t>
+            </a:r>
+            <a:endParaRPr lang="en-US" dirty="0"/>
+          </a:p>
+        </p:txBody>
+      </p:sp>
+      <p:sp>
+        <p:nvSpPr>
+          <p:cNvPr id="4" name="מציין מיקום של מספר שקופית 3"/>
+          <p:cNvSpPr>
+            <a:spLocks noGrp="1"/>
+          </p:cNvSpPr>
+          <p:nvPr>
+            <p:ph type="sldNum" sz="quarter" idx="10"/>
+          </p:nvPr>
+        </p:nvSpPr>
+        <p:spPr/>
+        <p:txBody>
+          <a:bodyPr/>
+          <a:lstStyle/>
+          <a:p>
+            <a:fld id="{C02DE9E0-C07F-48D7-94F8-678723A87F5D}" type="slidenum">
+              <a:rPr lang="en-US" smtClean="0"/>
+              <a:t>3</a:t>
+            </a:fld>
+            <a:endParaRPr lang="en-US"/>
+          </a:p>
+        </p:txBody>
+      </p:sp>
+    </p:spTree>
+    <p:extLst>
+      <p:ext uri="{BB962C8B-B14F-4D97-AF65-F5344CB8AC3E}">
+        <p14:creationId xmlns:p14="http://schemas.microsoft.com/office/powerpoint/2010/main" val="1003119218"/>
+      </p:ext>
+    </p:extLst>
+  </p:cSld>
+  <p:clrMapOvr>
+    <a:masterClrMapping/>
+  </p:clrMapOvr>
+</p:notes>
+</file>
+
+<file path=ppt/notesSlides/notesSlide3.xml><?xml version="1.0" encoding="utf-8"?>
+<p:notes xmlns:a="http://schemas.openxmlformats.org/drawingml/2006/main" xmlns:r="http://schemas.openxmlformats.org/officeDocument/2006/relationships" xmlns:p="http://schemas.openxmlformats.org/presentationml/2006/main">
+  <p:cSld>
+    <p:spTree>
+      <p:nvGrpSpPr>
+        <p:cNvPr id="1" name=""/>
+        <p:cNvGrpSpPr/>
+        <p:nvPr/>
+      </p:nvGrpSpPr>
+      <p:grpSpPr>
+        <a:xfrm>
+          <a:off x="0" y="0"/>
+          <a:ext cx="0" cy="0"/>
+          <a:chOff x="0" y="0"/>
+          <a:chExt cx="0" cy="0"/>
+        </a:xfrm>
+      </p:grpSpPr>
+      <p:sp>
+        <p:nvSpPr>
+          <p:cNvPr id="2" name="מציין מיקום של תמונת שקופית 1"/>
+          <p:cNvSpPr>
+            <a:spLocks noGrp="1" noRot="1" noChangeAspect="1"/>
+          </p:cNvSpPr>
+          <p:nvPr>
+            <p:ph type="sldImg"/>
+          </p:nvPr>
+        </p:nvSpPr>
+        <p:spPr/>
+      </p:sp>
+      <p:sp>
+        <p:nvSpPr>
+          <p:cNvPr id="3" name="מציין מיקום של הערות 2"/>
+          <p:cNvSpPr>
+            <a:spLocks noGrp="1"/>
+          </p:cNvSpPr>
+          <p:nvPr>
+            <p:ph type="body" idx="1"/>
+          </p:nvPr>
+        </p:nvSpPr>
+        <p:spPr/>
+        <p:txBody>
+          <a:bodyPr/>
+          <a:lstStyle/>
+          <a:p>
+            <a:r>
+              <a:rPr lang="he-IL" sz="1200" kern="1200" dirty="0">
+                <a:solidFill>
+                  <a:schemeClr val="tx1"/>
+                </a:solidFill>
+                <a:effectLst/>
+                <a:latin typeface="+mn-lt"/>
+                <a:ea typeface="+mn-ea"/>
+                <a:cs typeface="+mn-cs"/>
+              </a:rPr>
+              <a:t>תהליך שרץ יכול למפות את הקובץ למרחב הכתובות הווירטואלי שלו. כמובן שהתהליך לא יכול לשנות את תוכן הקובץ המקורי, אבל מה אם הוא רוצה לבצע שינויים זמניים שתקפים רק לעצמו? בעיקרון לא אמורה להיות שום בעיה, ומערכת ההפעלה באמת מאפשרת את זה.</a:t>
+            </a:r>
+            <a:endParaRPr lang="en-US" dirty="0"/>
+          </a:p>
+        </p:txBody>
+      </p:sp>
+      <p:sp>
+        <p:nvSpPr>
+          <p:cNvPr id="4" name="מציין מיקום של מספר שקופית 3"/>
+          <p:cNvSpPr>
+            <a:spLocks noGrp="1"/>
+          </p:cNvSpPr>
+          <p:nvPr>
+            <p:ph type="sldNum" sz="quarter" idx="10"/>
+          </p:nvPr>
+        </p:nvSpPr>
+        <p:spPr/>
+        <p:txBody>
+          <a:bodyPr/>
+          <a:lstStyle/>
+          <a:p>
+            <a:fld id="{C02DE9E0-C07F-48D7-94F8-678723A87F5D}" type="slidenum">
+              <a:rPr lang="en-US" smtClean="0"/>
+              <a:t>4</a:t>
+            </a:fld>
+            <a:endParaRPr lang="en-US"/>
+          </a:p>
+        </p:txBody>
+      </p:sp>
+    </p:spTree>
+    <p:extLst>
+      <p:ext uri="{BB962C8B-B14F-4D97-AF65-F5344CB8AC3E}">
+        <p14:creationId xmlns:p14="http://schemas.microsoft.com/office/powerpoint/2010/main" val="2183833477"/>
+      </p:ext>
+    </p:extLst>
+  </p:cSld>
+  <p:clrMapOvr>
+    <a:masterClrMapping/>
+  </p:clrMapOvr>
+</p:notes>
+</file>
+
+<file path=ppt/notesSlides/notesSlide4.xml><?xml version="1.0" encoding="utf-8"?>
+<p:notes xmlns:a="http://schemas.openxmlformats.org/drawingml/2006/main" xmlns:r="http://schemas.openxmlformats.org/officeDocument/2006/relationships" xmlns:p="http://schemas.openxmlformats.org/presentationml/2006/main">
+  <p:cSld>
+    <p:spTree>
+      <p:nvGrpSpPr>
+        <p:cNvPr id="1" name=""/>
+        <p:cNvGrpSpPr/>
+        <p:nvPr/>
+      </p:nvGrpSpPr>
+      <p:grpSpPr>
+        <a:xfrm>
+          <a:off x="0" y="0"/>
+          <a:ext cx="0" cy="0"/>
+          <a:chOff x="0" y="0"/>
+          <a:chExt cx="0" cy="0"/>
+        </a:xfrm>
+      </p:grpSpPr>
+      <p:sp>
+        <p:nvSpPr>
+          <p:cNvPr id="2" name="מציין מיקום של תמונת שקופית 1"/>
+          <p:cNvSpPr>
+            <a:spLocks noGrp="1" noRot="1" noChangeAspect="1"/>
+          </p:cNvSpPr>
+          <p:nvPr>
+            <p:ph type="sldImg"/>
+          </p:nvPr>
+        </p:nvSpPr>
+        <p:spPr/>
+      </p:sp>
+      <p:sp>
+        <p:nvSpPr>
+          <p:cNvPr id="3" name="מציין מיקום של הערות 2"/>
+          <p:cNvSpPr>
+            <a:spLocks noGrp="1"/>
+          </p:cNvSpPr>
+          <p:nvPr>
+            <p:ph type="body" idx="1"/>
+          </p:nvPr>
+        </p:nvSpPr>
+        <p:spPr/>
+        <p:txBody>
+          <a:bodyPr/>
+          <a:lstStyle/>
+          <a:p>
+            <a:r>
+              <a:rPr lang="he-IL" sz="1200" kern="1200" dirty="0">
+                <a:solidFill>
+                  <a:schemeClr val="tx1"/>
+                </a:solidFill>
+                <a:effectLst/>
+                <a:latin typeface="+mn-lt"/>
+                <a:ea typeface="+mn-ea"/>
+                <a:cs typeface="+mn-cs"/>
+              </a:rPr>
+              <a:t>ניתן למפות את הקובץ למרחב הכתובות הווירטואלי עם הדגל </a:t>
+            </a:r>
+            <a:r>
+              <a:rPr lang="en-US" sz="1200" kern="1200" dirty="0">
+                <a:solidFill>
+                  <a:schemeClr val="tx1"/>
+                </a:solidFill>
+                <a:effectLst/>
+                <a:latin typeface="+mn-lt"/>
+                <a:ea typeface="+mn-ea"/>
+                <a:cs typeface="+mn-cs"/>
+              </a:rPr>
+              <a:t>MAP_PRIVATE</a:t>
+            </a:r>
+            <a:r>
+              <a:rPr lang="he-IL" sz="1200" kern="1200" dirty="0">
+                <a:solidFill>
+                  <a:schemeClr val="tx1"/>
+                </a:solidFill>
+                <a:effectLst/>
+                <a:latin typeface="+mn-lt"/>
+                <a:ea typeface="+mn-ea"/>
+                <a:cs typeface="+mn-cs"/>
+              </a:rPr>
+              <a:t>, מה שמאפשר את השימוש ב</a:t>
+            </a:r>
+            <a:r>
+              <a:rPr lang="en-US" sz="1200" kern="1200" dirty="0">
+                <a:solidFill>
+                  <a:schemeClr val="tx1"/>
+                </a:solidFill>
+                <a:effectLst/>
+                <a:latin typeface="+mn-lt"/>
+                <a:ea typeface="+mn-ea"/>
+                <a:cs typeface="+mn-cs"/>
+              </a:rPr>
+              <a:t>COW</a:t>
+            </a:r>
+            <a:r>
+              <a:rPr lang="he-IL" sz="1200" kern="1200" dirty="0">
+                <a:solidFill>
+                  <a:schemeClr val="tx1"/>
+                </a:solidFill>
+                <a:effectLst/>
+                <a:latin typeface="+mn-lt"/>
+                <a:ea typeface="+mn-ea"/>
+                <a:cs typeface="+mn-cs"/>
+              </a:rPr>
+              <a:t>. מנגנון ה </a:t>
+            </a:r>
+            <a:r>
+              <a:rPr lang="en-US" sz="1200" kern="1200" dirty="0">
+                <a:solidFill>
+                  <a:schemeClr val="tx1"/>
+                </a:solidFill>
+                <a:effectLst/>
+                <a:latin typeface="+mn-lt"/>
+                <a:ea typeface="+mn-ea"/>
+                <a:cs typeface="+mn-cs"/>
+              </a:rPr>
+              <a:t>COW</a:t>
+            </a:r>
+            <a:r>
+              <a:rPr lang="he-IL" sz="1200" kern="1200" dirty="0">
+                <a:solidFill>
+                  <a:schemeClr val="tx1"/>
+                </a:solidFill>
+                <a:effectLst/>
+                <a:latin typeface="+mn-lt"/>
+                <a:ea typeface="+mn-ea"/>
+                <a:cs typeface="+mn-cs"/>
+              </a:rPr>
+              <a:t> אומר שכל עוד התהליך רק קורא מאותן הכתובות, המיפוי יצביע לעותק המקורי שלהן,</a:t>
+            </a:r>
+            <a:endParaRPr lang="en-US" dirty="0"/>
+          </a:p>
+        </p:txBody>
+      </p:sp>
+      <p:sp>
+        <p:nvSpPr>
+          <p:cNvPr id="4" name="מציין מיקום של מספר שקופית 3"/>
+          <p:cNvSpPr>
+            <a:spLocks noGrp="1"/>
+          </p:cNvSpPr>
+          <p:nvPr>
+            <p:ph type="sldNum" sz="quarter" idx="10"/>
+          </p:nvPr>
+        </p:nvSpPr>
+        <p:spPr/>
+        <p:txBody>
+          <a:bodyPr/>
+          <a:lstStyle/>
+          <a:p>
+            <a:fld id="{C02DE9E0-C07F-48D7-94F8-678723A87F5D}" type="slidenum">
+              <a:rPr lang="en-US" smtClean="0"/>
+              <a:t>5</a:t>
+            </a:fld>
+            <a:endParaRPr lang="en-US"/>
+          </a:p>
+        </p:txBody>
+      </p:sp>
+    </p:spTree>
+    <p:extLst>
+      <p:ext uri="{BB962C8B-B14F-4D97-AF65-F5344CB8AC3E}">
+        <p14:creationId xmlns:p14="http://schemas.microsoft.com/office/powerpoint/2010/main" val="3535670324"/>
+      </p:ext>
+    </p:extLst>
+  </p:cSld>
+  <p:clrMapOvr>
+    <a:masterClrMapping/>
+  </p:clrMapOvr>
+</p:notes>
+</file>
+
+<file path=ppt/notesSlides/notesSlide5.xml><?xml version="1.0" encoding="utf-8"?>
+<p:notes xmlns:a="http://schemas.openxmlformats.org/drawingml/2006/main" xmlns:r="http://schemas.openxmlformats.org/officeDocument/2006/relationships" xmlns:p="http://schemas.openxmlformats.org/presentationml/2006/main">
+  <p:cSld>
+    <p:spTree>
+      <p:nvGrpSpPr>
+        <p:cNvPr id="1" name=""/>
+        <p:cNvGrpSpPr/>
+        <p:nvPr/>
+      </p:nvGrpSpPr>
+      <p:grpSpPr>
+        <a:xfrm>
+          <a:off x="0" y="0"/>
+          <a:ext cx="0" cy="0"/>
+          <a:chOff x="0" y="0"/>
+          <a:chExt cx="0" cy="0"/>
+        </a:xfrm>
+      </p:grpSpPr>
+      <p:sp>
+        <p:nvSpPr>
+          <p:cNvPr id="2" name="מציין מיקום של תמונת שקופית 1"/>
+          <p:cNvSpPr>
+            <a:spLocks noGrp="1" noRot="1" noChangeAspect="1"/>
+          </p:cNvSpPr>
+          <p:nvPr>
+            <p:ph type="sldImg"/>
+          </p:nvPr>
+        </p:nvSpPr>
+        <p:spPr/>
+      </p:sp>
+      <p:sp>
+        <p:nvSpPr>
+          <p:cNvPr id="3" name="מציין מיקום של הערות 2"/>
+          <p:cNvSpPr>
+            <a:spLocks noGrp="1"/>
+          </p:cNvSpPr>
+          <p:nvPr>
+            <p:ph type="body" idx="1"/>
+          </p:nvPr>
+        </p:nvSpPr>
+        <p:spPr/>
+        <p:txBody>
+          <a:bodyPr/>
+          <a:lstStyle/>
+          <a:p>
+            <a:r>
+              <a:rPr lang="he-IL" sz="1200" kern="1200" dirty="0">
+                <a:solidFill>
+                  <a:schemeClr val="tx1"/>
+                </a:solidFill>
+                <a:effectLst/>
+                <a:latin typeface="+mn-lt"/>
+                <a:ea typeface="+mn-ea"/>
+                <a:cs typeface="+mn-cs"/>
+              </a:rPr>
+              <a:t>אבל ברגע שתהליך יבצע כתיבה, הוא ייצור את העותק וישנה את המיפוי של הכתובות הווירטואליות אליו.</a:t>
+            </a:r>
+            <a:endParaRPr lang="en-US" dirty="0"/>
+          </a:p>
+        </p:txBody>
+      </p:sp>
+      <p:sp>
+        <p:nvSpPr>
+          <p:cNvPr id="4" name="מציין מיקום של מספר שקופית 3"/>
+          <p:cNvSpPr>
+            <a:spLocks noGrp="1"/>
+          </p:cNvSpPr>
+          <p:nvPr>
+            <p:ph type="sldNum" sz="quarter" idx="10"/>
+          </p:nvPr>
+        </p:nvSpPr>
+        <p:spPr/>
+        <p:txBody>
+          <a:bodyPr/>
+          <a:lstStyle/>
+          <a:p>
+            <a:fld id="{C02DE9E0-C07F-48D7-94F8-678723A87F5D}" type="slidenum">
+              <a:rPr lang="en-US" smtClean="0"/>
+              <a:t>6</a:t>
+            </a:fld>
+            <a:endParaRPr lang="en-US"/>
+          </a:p>
+        </p:txBody>
+      </p:sp>
+    </p:spTree>
+    <p:extLst>
+      <p:ext uri="{BB962C8B-B14F-4D97-AF65-F5344CB8AC3E}">
+        <p14:creationId xmlns:p14="http://schemas.microsoft.com/office/powerpoint/2010/main" val="3133885939"/>
+      </p:ext>
+    </p:extLst>
+  </p:cSld>
+  <p:clrMapOvr>
+    <a:masterClrMapping/>
+  </p:clrMapOvr>
+</p:notes>
+</file>
+
+<file path=ppt/notesSlides/notesSlide6.xml><?xml version="1.0" encoding="utf-8"?>
+<p:notes xmlns:a="http://schemas.openxmlformats.org/drawingml/2006/main" xmlns:r="http://schemas.openxmlformats.org/officeDocument/2006/relationships" xmlns:p="http://schemas.openxmlformats.org/presentationml/2006/main">
+  <p:cSld>
+    <p:spTree>
+      <p:nvGrpSpPr>
+        <p:cNvPr id="1" name=""/>
+        <p:cNvGrpSpPr/>
+        <p:nvPr/>
+      </p:nvGrpSpPr>
+      <p:grpSpPr>
+        <a:xfrm>
+          <a:off x="0" y="0"/>
+          <a:ext cx="0" cy="0"/>
+          <a:chOff x="0" y="0"/>
+          <a:chExt cx="0" cy="0"/>
+        </a:xfrm>
+      </p:grpSpPr>
+      <p:sp>
+        <p:nvSpPr>
+          <p:cNvPr id="2" name="מציין מיקום של תמונת שקופית 1"/>
+          <p:cNvSpPr>
+            <a:spLocks noGrp="1" noRot="1" noChangeAspect="1"/>
+          </p:cNvSpPr>
+          <p:nvPr>
+            <p:ph type="sldImg"/>
+          </p:nvPr>
+        </p:nvSpPr>
+        <p:spPr/>
+      </p:sp>
+      <p:sp>
+        <p:nvSpPr>
+          <p:cNvPr id="3" name="מציין מיקום של הערות 2"/>
+          <p:cNvSpPr>
+            <a:spLocks noGrp="1"/>
+          </p:cNvSpPr>
+          <p:nvPr>
+            <p:ph type="body" idx="1"/>
+          </p:nvPr>
+        </p:nvSpPr>
+        <p:spPr/>
+        <p:txBody>
+          <a:bodyPr/>
+          <a:lstStyle/>
+          <a:p>
+            <a:pPr marL="0" marR="0" lvl="0" indent="0" algn="r" defTabSz="914400" rtl="1" eaLnBrk="1" fontAlgn="auto" latinLnBrk="0" hangingPunct="1">
+              <a:lnSpc>
+                <a:spcPct val="100000"/>
+              </a:lnSpc>
+              <a:spcBef>
+                <a:spcPts val="0"/>
+              </a:spcBef>
+              <a:spcAft>
+                <a:spcPts val="0"/>
+              </a:spcAft>
+              <a:buClrTx/>
+              <a:buSzTx/>
+              <a:buFontTx/>
+              <a:buNone/>
+              <a:tabLst/>
+              <a:defRPr/>
+            </a:pPr>
+            <a:r>
+              <a:rPr lang="he-IL" sz="1200" kern="1200" dirty="0">
+                <a:solidFill>
+                  <a:schemeClr val="tx1"/>
+                </a:solidFill>
+                <a:effectLst/>
+                <a:latin typeface="+mn-lt"/>
+                <a:ea typeface="+mn-ea"/>
+                <a:cs typeface="+mn-cs"/>
+              </a:rPr>
+              <a:t>רק לאחר מכן הוא יכתוב לתוכו.</a:t>
+            </a:r>
+            <a:endParaRPr lang="en-US" sz="1200" kern="1200" dirty="0">
+              <a:solidFill>
+                <a:schemeClr val="tx1"/>
+              </a:solidFill>
+              <a:effectLst/>
+              <a:latin typeface="+mn-lt"/>
+              <a:ea typeface="+mn-ea"/>
+              <a:cs typeface="+mn-cs"/>
+            </a:endParaRPr>
+          </a:p>
+          <a:p>
+            <a:endParaRPr lang="en-US" dirty="0"/>
+          </a:p>
+        </p:txBody>
+      </p:sp>
+      <p:sp>
+        <p:nvSpPr>
+          <p:cNvPr id="4" name="מציין מיקום של מספר שקופית 3"/>
+          <p:cNvSpPr>
+            <a:spLocks noGrp="1"/>
+          </p:cNvSpPr>
+          <p:nvPr>
+            <p:ph type="sldNum" sz="quarter" idx="10"/>
+          </p:nvPr>
+        </p:nvSpPr>
+        <p:spPr/>
+        <p:txBody>
+          <a:bodyPr/>
+          <a:lstStyle/>
+          <a:p>
+            <a:fld id="{C02DE9E0-C07F-48D7-94F8-678723A87F5D}" type="slidenum">
+              <a:rPr lang="en-US" smtClean="0"/>
+              <a:t>7</a:t>
+            </a:fld>
+            <a:endParaRPr lang="en-US"/>
+          </a:p>
+        </p:txBody>
+      </p:sp>
+    </p:spTree>
+    <p:extLst>
+      <p:ext uri="{BB962C8B-B14F-4D97-AF65-F5344CB8AC3E}">
+        <p14:creationId xmlns:p14="http://schemas.microsoft.com/office/powerpoint/2010/main" val="1678234417"/>
+      </p:ext>
+    </p:extLst>
+  </p:cSld>
+  <p:clrMapOvr>
+    <a:masterClrMapping/>
+  </p:clrMapOvr>
+</p:notes>
+</file>
+
+<file path=ppt/notesSlides/notesSlide7.xml><?xml version="1.0" encoding="utf-8"?>
+<p:notes xmlns:a="http://schemas.openxmlformats.org/drawingml/2006/main" xmlns:r="http://schemas.openxmlformats.org/officeDocument/2006/relationships" xmlns:p="http://schemas.openxmlformats.org/presentationml/2006/main">
+  <p:cSld>
+    <p:spTree>
+      <p:nvGrpSpPr>
+        <p:cNvPr id="1" name=""/>
+        <p:cNvGrpSpPr/>
+        <p:nvPr/>
+      </p:nvGrpSpPr>
+      <p:grpSpPr>
+        <a:xfrm>
+          <a:off x="0" y="0"/>
+          <a:ext cx="0" cy="0"/>
+          <a:chOff x="0" y="0"/>
+          <a:chExt cx="0" cy="0"/>
+        </a:xfrm>
+      </p:grpSpPr>
+      <p:sp>
+        <p:nvSpPr>
+          <p:cNvPr id="2" name="מציין מיקום של תמונת שקופית 1"/>
+          <p:cNvSpPr>
+            <a:spLocks noGrp="1" noRot="1" noChangeAspect="1"/>
+          </p:cNvSpPr>
+          <p:nvPr>
+            <p:ph type="sldImg"/>
+          </p:nvPr>
+        </p:nvSpPr>
+        <p:spPr/>
+      </p:sp>
+      <p:sp>
+        <p:nvSpPr>
+          <p:cNvPr id="3" name="מציין מיקום של הערות 2"/>
+          <p:cNvSpPr>
+            <a:spLocks noGrp="1"/>
+          </p:cNvSpPr>
+          <p:nvPr>
+            <p:ph type="body" idx="1"/>
+          </p:nvPr>
+        </p:nvSpPr>
+        <p:spPr/>
+        <p:txBody>
+          <a:bodyPr/>
+          <a:lstStyle/>
+          <a:p>
+            <a:pPr marL="0" marR="0" lvl="0" indent="0" algn="r" defTabSz="914400" rtl="1" eaLnBrk="1" fontAlgn="auto" latinLnBrk="0" hangingPunct="1">
+              <a:lnSpc>
+                <a:spcPct val="100000"/>
+              </a:lnSpc>
+              <a:spcBef>
+                <a:spcPts val="0"/>
+              </a:spcBef>
+              <a:spcAft>
+                <a:spcPts val="0"/>
+              </a:spcAft>
+              <a:buClrTx/>
+              <a:buSzTx/>
+              <a:buFontTx/>
+              <a:buNone/>
+              <a:tabLst/>
+              <a:defRPr/>
+            </a:pPr>
+            <a:r>
+              <a:rPr lang="he-IL" sz="1200" kern="1200" dirty="0">
+                <a:solidFill>
+                  <a:schemeClr val="tx1"/>
+                </a:solidFill>
+                <a:effectLst/>
+                <a:latin typeface="+mn-lt"/>
+                <a:ea typeface="+mn-ea"/>
+                <a:cs typeface="+mn-cs"/>
+              </a:rPr>
+              <a:t>בשלב הראשון, הקוד טוען את הקובץ הרצוי בהרשאות קריאה בלבד אל הזיכרון.</a:t>
+            </a:r>
+            <a:endParaRPr lang="en-US" sz="1200" kern="1200" dirty="0">
+              <a:solidFill>
+                <a:schemeClr val="tx1"/>
+              </a:solidFill>
+              <a:effectLst/>
+              <a:latin typeface="+mn-lt"/>
+              <a:ea typeface="+mn-ea"/>
+              <a:cs typeface="+mn-cs"/>
+            </a:endParaRPr>
+          </a:p>
+          <a:p>
+            <a:endParaRPr lang="en-US" dirty="0"/>
+          </a:p>
+        </p:txBody>
+      </p:sp>
+      <p:sp>
+        <p:nvSpPr>
+          <p:cNvPr id="4" name="מציין מיקום של מספר שקופית 3"/>
+          <p:cNvSpPr>
+            <a:spLocks noGrp="1"/>
+          </p:cNvSpPr>
+          <p:nvPr>
+            <p:ph type="sldNum" sz="quarter" idx="10"/>
+          </p:nvPr>
+        </p:nvSpPr>
+        <p:spPr/>
+        <p:txBody>
+          <a:bodyPr/>
+          <a:lstStyle/>
+          <a:p>
+            <a:fld id="{C02DE9E0-C07F-48D7-94F8-678723A87F5D}" type="slidenum">
+              <a:rPr lang="en-US" smtClean="0"/>
+              <a:t>8</a:t>
+            </a:fld>
+            <a:endParaRPr lang="en-US"/>
+          </a:p>
+        </p:txBody>
+      </p:sp>
+    </p:spTree>
+    <p:extLst>
+      <p:ext uri="{BB962C8B-B14F-4D97-AF65-F5344CB8AC3E}">
+        <p14:creationId xmlns:p14="http://schemas.microsoft.com/office/powerpoint/2010/main" val="3739585612"/>
+      </p:ext>
+    </p:extLst>
+  </p:cSld>
+  <p:clrMapOvr>
+    <a:masterClrMapping/>
+  </p:clrMapOvr>
+</p:notes>
+</file>
+
+<file path=ppt/notesSlides/notesSlide8.xml><?xml version="1.0" encoding="utf-8"?>
+<p:notes xmlns:a="http://schemas.openxmlformats.org/drawingml/2006/main" xmlns:r="http://schemas.openxmlformats.org/officeDocument/2006/relationships" xmlns:p="http://schemas.openxmlformats.org/presentationml/2006/main">
+  <p:cSld>
+    <p:spTree>
+      <p:nvGrpSpPr>
+        <p:cNvPr id="1" name=""/>
+        <p:cNvGrpSpPr/>
+        <p:nvPr/>
+      </p:nvGrpSpPr>
+      <p:grpSpPr>
+        <a:xfrm>
+          <a:off x="0" y="0"/>
+          <a:ext cx="0" cy="0"/>
+          <a:chOff x="0" y="0"/>
+          <a:chExt cx="0" cy="0"/>
+        </a:xfrm>
+      </p:grpSpPr>
+      <p:sp>
+        <p:nvSpPr>
+          <p:cNvPr id="2" name="מציין מיקום של תמונת שקופית 1"/>
+          <p:cNvSpPr>
+            <a:spLocks noGrp="1" noRot="1" noChangeAspect="1"/>
+          </p:cNvSpPr>
+          <p:nvPr>
+            <p:ph type="sldImg"/>
+          </p:nvPr>
+        </p:nvSpPr>
+        <p:spPr/>
+      </p:sp>
+      <p:sp>
+        <p:nvSpPr>
+          <p:cNvPr id="3" name="מציין מיקום של הערות 2"/>
+          <p:cNvSpPr>
+            <a:spLocks noGrp="1"/>
+          </p:cNvSpPr>
+          <p:nvPr>
+            <p:ph type="body" idx="1"/>
+          </p:nvPr>
+        </p:nvSpPr>
+        <p:spPr/>
+        <p:txBody>
+          <a:bodyPr/>
+          <a:lstStyle/>
+          <a:p>
+            <a:pPr marL="0" marR="0" lvl="0" indent="0" algn="r" defTabSz="914400" rtl="1" eaLnBrk="1" fontAlgn="auto" latinLnBrk="0" hangingPunct="1">
+              <a:lnSpc>
+                <a:spcPct val="100000"/>
+              </a:lnSpc>
+              <a:spcBef>
+                <a:spcPts val="0"/>
+              </a:spcBef>
+              <a:spcAft>
+                <a:spcPts val="0"/>
+              </a:spcAft>
+              <a:buClrTx/>
+              <a:buSzTx/>
+              <a:buFontTx/>
+              <a:buNone/>
+              <a:tabLst/>
+              <a:defRPr/>
+            </a:pPr>
+            <a:r>
+              <a:rPr lang="he-IL" sz="1200" kern="1200" dirty="0">
+                <a:solidFill>
+                  <a:schemeClr val="tx1"/>
+                </a:solidFill>
+                <a:effectLst/>
+                <a:latin typeface="+mn-lt"/>
+                <a:ea typeface="+mn-ea"/>
+                <a:cs typeface="+mn-cs"/>
+              </a:rPr>
+              <a:t>אחר כך, מתבצע מיפוי של הקובץ אל התהליך, אפשר לראות שמועבר גם הדגל </a:t>
+            </a:r>
+            <a:r>
+              <a:rPr lang="en-US" sz="1200" kern="1200" dirty="0">
+                <a:solidFill>
+                  <a:schemeClr val="tx1"/>
+                </a:solidFill>
+                <a:effectLst/>
+                <a:latin typeface="+mn-lt"/>
+                <a:ea typeface="+mn-ea"/>
+                <a:cs typeface="+mn-cs"/>
+              </a:rPr>
+              <a:t>MAP_PRIVATE</a:t>
+            </a:r>
+            <a:r>
+              <a:rPr lang="he-IL" sz="1200" kern="1200" dirty="0">
+                <a:solidFill>
+                  <a:schemeClr val="tx1"/>
+                </a:solidFill>
+                <a:effectLst/>
+                <a:latin typeface="+mn-lt"/>
+                <a:ea typeface="+mn-ea"/>
+                <a:cs typeface="+mn-cs"/>
+              </a:rPr>
+              <a:t> על מנת לאפשר </a:t>
+            </a:r>
+            <a:r>
+              <a:rPr lang="en-US" sz="1200" kern="1200" dirty="0">
+                <a:solidFill>
+                  <a:schemeClr val="tx1"/>
+                </a:solidFill>
+                <a:effectLst/>
+                <a:latin typeface="+mn-lt"/>
+                <a:ea typeface="+mn-ea"/>
+                <a:cs typeface="+mn-cs"/>
+              </a:rPr>
+              <a:t>COW</a:t>
+            </a:r>
+            <a:r>
+              <a:rPr lang="he-IL" sz="1200" kern="1200" dirty="0">
+                <a:solidFill>
+                  <a:schemeClr val="tx1"/>
+                </a:solidFill>
+                <a:effectLst/>
+                <a:latin typeface="+mn-lt"/>
+                <a:ea typeface="+mn-ea"/>
+                <a:cs typeface="+mn-cs"/>
+              </a:rPr>
+              <a:t>. </a:t>
+            </a:r>
+            <a:endParaRPr lang="en-US" sz="1200" kern="1200" dirty="0">
+              <a:solidFill>
+                <a:schemeClr val="tx1"/>
+              </a:solidFill>
+              <a:effectLst/>
+              <a:latin typeface="+mn-lt"/>
+              <a:ea typeface="+mn-ea"/>
+              <a:cs typeface="+mn-cs"/>
+            </a:endParaRPr>
+          </a:p>
+          <a:p>
+            <a:endParaRPr lang="en-US" dirty="0"/>
+          </a:p>
+        </p:txBody>
+      </p:sp>
+      <p:sp>
+        <p:nvSpPr>
+          <p:cNvPr id="4" name="מציין מיקום של מספר שקופית 3"/>
+          <p:cNvSpPr>
+            <a:spLocks noGrp="1"/>
+          </p:cNvSpPr>
+          <p:nvPr>
+            <p:ph type="sldNum" sz="quarter" idx="10"/>
+          </p:nvPr>
+        </p:nvSpPr>
+        <p:spPr/>
+        <p:txBody>
+          <a:bodyPr/>
+          <a:lstStyle/>
+          <a:p>
+            <a:fld id="{C02DE9E0-C07F-48D7-94F8-678723A87F5D}" type="slidenum">
+              <a:rPr lang="en-US" smtClean="0"/>
+              <a:t>9</a:t>
+            </a:fld>
+            <a:endParaRPr lang="en-US"/>
+          </a:p>
+        </p:txBody>
+      </p:sp>
+    </p:spTree>
+    <p:extLst>
+      <p:ext uri="{BB962C8B-B14F-4D97-AF65-F5344CB8AC3E}">
+        <p14:creationId xmlns:p14="http://schemas.microsoft.com/office/powerpoint/2010/main" val="1504595901"/>
+      </p:ext>
+    </p:extLst>
+  </p:cSld>
+  <p:clrMapOvr>
+    <a:masterClrMapping/>
+  </p:clrMapOvr>
+</p:notes>
+</file>
+
+<file path=ppt/notesSlides/notesSlide9.xml><?xml version="1.0" encoding="utf-8"?>
+<p:notes xmlns:a="http://schemas.openxmlformats.org/drawingml/2006/main" xmlns:r="http://schemas.openxmlformats.org/officeDocument/2006/relationships" xmlns:p="http://schemas.openxmlformats.org/presentationml/2006/main">
+  <p:cSld>
+    <p:spTree>
+      <p:nvGrpSpPr>
+        <p:cNvPr id="1" name=""/>
+        <p:cNvGrpSpPr/>
+        <p:nvPr/>
+      </p:nvGrpSpPr>
+      <p:grpSpPr>
+        <a:xfrm>
+          <a:off x="0" y="0"/>
+          <a:ext cx="0" cy="0"/>
+          <a:chOff x="0" y="0"/>
+          <a:chExt cx="0" cy="0"/>
+        </a:xfrm>
+      </p:grpSpPr>
+      <p:sp>
+        <p:nvSpPr>
+          <p:cNvPr id="2" name="מציין מיקום של תמונת שקופית 1"/>
+          <p:cNvSpPr>
+            <a:spLocks noGrp="1" noRot="1" noChangeAspect="1"/>
+          </p:cNvSpPr>
+          <p:nvPr>
+            <p:ph type="sldImg"/>
+          </p:nvPr>
+        </p:nvSpPr>
+        <p:spPr/>
+      </p:sp>
+      <p:sp>
+        <p:nvSpPr>
+          <p:cNvPr id="3" name="מציין מיקום של הערות 2"/>
+          <p:cNvSpPr>
+            <a:spLocks noGrp="1"/>
+          </p:cNvSpPr>
+          <p:nvPr>
+            <p:ph type="body" idx="1"/>
+          </p:nvPr>
+        </p:nvSpPr>
+        <p:spPr/>
+        <p:txBody>
+          <a:bodyPr/>
+          <a:lstStyle/>
+          <a:p>
+            <a:pPr rtl="1"/>
+            <a:r>
+              <a:rPr lang="he-IL" sz="1200" kern="1200" dirty="0">
+                <a:solidFill>
+                  <a:schemeClr val="tx1"/>
+                </a:solidFill>
+                <a:effectLst/>
+                <a:latin typeface="+mn-lt"/>
+                <a:ea typeface="+mn-ea"/>
+                <a:cs typeface="+mn-cs"/>
+              </a:rPr>
+              <a:t>ואז מורצים שני </a:t>
+            </a:r>
+            <a:r>
+              <a:rPr lang="en-US" sz="1200" kern="1200" dirty="0">
+                <a:solidFill>
+                  <a:schemeClr val="tx1"/>
+                </a:solidFill>
+                <a:effectLst/>
+                <a:latin typeface="+mn-lt"/>
+                <a:ea typeface="+mn-ea"/>
+                <a:cs typeface="+mn-cs"/>
+              </a:rPr>
+              <a:t>thread</a:t>
+            </a:r>
+            <a:r>
+              <a:rPr lang="he-IL" sz="1200" kern="1200" dirty="0">
+                <a:solidFill>
+                  <a:schemeClr val="tx1"/>
+                </a:solidFill>
+                <a:effectLst/>
+                <a:latin typeface="+mn-lt"/>
+                <a:ea typeface="+mn-ea"/>
+                <a:cs typeface="+mn-cs"/>
+              </a:rPr>
+              <a:t>-ים במקביל.</a:t>
+            </a:r>
+            <a:endParaRPr lang="en-US" sz="1200" kern="1200" dirty="0">
+              <a:solidFill>
+                <a:schemeClr val="tx1"/>
+              </a:solidFill>
+              <a:effectLst/>
+              <a:latin typeface="+mn-lt"/>
+              <a:ea typeface="+mn-ea"/>
+              <a:cs typeface="+mn-cs"/>
+            </a:endParaRPr>
+          </a:p>
+        </p:txBody>
+      </p:sp>
+      <p:sp>
+        <p:nvSpPr>
+          <p:cNvPr id="4" name="מציין מיקום של מספר שקופית 3"/>
+          <p:cNvSpPr>
+            <a:spLocks noGrp="1"/>
+          </p:cNvSpPr>
+          <p:nvPr>
+            <p:ph type="sldNum" sz="quarter" idx="10"/>
+          </p:nvPr>
+        </p:nvSpPr>
+        <p:spPr/>
+        <p:txBody>
+          <a:bodyPr/>
+          <a:lstStyle/>
+          <a:p>
+            <a:fld id="{C02DE9E0-C07F-48D7-94F8-678723A87F5D}" type="slidenum">
+              <a:rPr lang="en-US" smtClean="0"/>
+              <a:t>10</a:t>
+            </a:fld>
+            <a:endParaRPr lang="en-US"/>
+          </a:p>
+        </p:txBody>
+      </p:sp>
+    </p:spTree>
+    <p:extLst>
+      <p:ext uri="{BB962C8B-B14F-4D97-AF65-F5344CB8AC3E}">
+        <p14:creationId xmlns:p14="http://schemas.microsoft.com/office/powerpoint/2010/main" val="3363414029"/>
+      </p:ext>
+    </p:extLst>
+  </p:cSld>
+  <p:clrMapOvr>
+    <a:masterClrMapping/>
+  </p:clrMapOvr>
+</p:notes>
 </file>
 
 <file path=ppt/slideLayouts/slideLayout1.xml><?xml version="1.0" encoding="utf-8"?>
@@ -258,7 +2221,7 @@
           <a:p>
             <a:fld id="{E01218AB-18BE-4DFD-AD49-AF0CB45C28F4}" type="datetimeFigureOut">
               <a:rPr lang="en-US" smtClean="0"/>
-              <a:t>12/29/2021</a:t>
+              <a:t>1/3/2022</a:t>
             </a:fld>
             <a:endParaRPr lang="en-US"/>
           </a:p>
@@ -458,7 +2421,7 @@
           <a:p>
             <a:fld id="{E01218AB-18BE-4DFD-AD49-AF0CB45C28F4}" type="datetimeFigureOut">
               <a:rPr lang="en-US" smtClean="0"/>
-              <a:t>12/29/2021</a:t>
+              <a:t>1/3/2022</a:t>
             </a:fld>
             <a:endParaRPr lang="en-US"/>
           </a:p>
@@ -668,7 +2631,7 @@
           <a:p>
             <a:fld id="{E01218AB-18BE-4DFD-AD49-AF0CB45C28F4}" type="datetimeFigureOut">
               <a:rPr lang="en-US" smtClean="0"/>
-              <a:t>12/29/2021</a:t>
+              <a:t>1/3/2022</a:t>
             </a:fld>
             <a:endParaRPr lang="en-US"/>
           </a:p>
@@ -868,7 +2831,7 @@
           <a:p>
             <a:fld id="{E01218AB-18BE-4DFD-AD49-AF0CB45C28F4}" type="datetimeFigureOut">
               <a:rPr lang="en-US" smtClean="0"/>
-              <a:t>12/29/2021</a:t>
+              <a:t>1/3/2022</a:t>
             </a:fld>
             <a:endParaRPr lang="en-US"/>
           </a:p>
@@ -1144,7 +3107,7 @@
           <a:p>
             <a:fld id="{E01218AB-18BE-4DFD-AD49-AF0CB45C28F4}" type="datetimeFigureOut">
               <a:rPr lang="en-US" smtClean="0"/>
-              <a:t>12/29/2021</a:t>
+              <a:t>1/3/2022</a:t>
             </a:fld>
             <a:endParaRPr lang="en-US"/>
           </a:p>
@@ -1412,7 +3375,7 @@
           <a:p>
             <a:fld id="{E01218AB-18BE-4DFD-AD49-AF0CB45C28F4}" type="datetimeFigureOut">
               <a:rPr lang="en-US" smtClean="0"/>
-              <a:t>12/29/2021</a:t>
+              <a:t>1/3/2022</a:t>
             </a:fld>
             <a:endParaRPr lang="en-US"/>
           </a:p>
@@ -1827,7 +3790,7 @@
           <a:p>
             <a:fld id="{E01218AB-18BE-4DFD-AD49-AF0CB45C28F4}" type="datetimeFigureOut">
               <a:rPr lang="en-US" smtClean="0"/>
-              <a:t>12/29/2021</a:t>
+              <a:t>1/3/2022</a:t>
             </a:fld>
             <a:endParaRPr lang="en-US"/>
           </a:p>
@@ -1969,7 +3932,7 @@
           <a:p>
             <a:fld id="{E01218AB-18BE-4DFD-AD49-AF0CB45C28F4}" type="datetimeFigureOut">
               <a:rPr lang="en-US" smtClean="0"/>
-              <a:t>12/29/2021</a:t>
+              <a:t>1/3/2022</a:t>
             </a:fld>
             <a:endParaRPr lang="en-US"/>
           </a:p>
@@ -2082,7 +4045,7 @@
           <a:p>
             <a:fld id="{E01218AB-18BE-4DFD-AD49-AF0CB45C28F4}" type="datetimeFigureOut">
               <a:rPr lang="en-US" smtClean="0"/>
-              <a:t>12/29/2021</a:t>
+              <a:t>1/3/2022</a:t>
             </a:fld>
             <a:endParaRPr lang="en-US"/>
           </a:p>
@@ -2395,7 +4358,7 @@
           <a:p>
             <a:fld id="{E01218AB-18BE-4DFD-AD49-AF0CB45C28F4}" type="datetimeFigureOut">
               <a:rPr lang="en-US" smtClean="0"/>
-              <a:t>12/29/2021</a:t>
+              <a:t>1/3/2022</a:t>
             </a:fld>
             <a:endParaRPr lang="en-US"/>
           </a:p>
@@ -2684,7 +4647,7 @@
           <a:p>
             <a:fld id="{E01218AB-18BE-4DFD-AD49-AF0CB45C28F4}" type="datetimeFigureOut">
               <a:rPr lang="en-US" smtClean="0"/>
-              <a:t>12/29/2021</a:t>
+              <a:t>1/3/2022</a:t>
             </a:fld>
             <a:endParaRPr lang="en-US"/>
           </a:p>
@@ -2927,7 +4890,7 @@
           <a:p>
             <a:fld id="{E01218AB-18BE-4DFD-AD49-AF0CB45C28F4}" type="datetimeFigureOut">
               <a:rPr lang="en-US" smtClean="0"/>
-              <a:t>12/29/2021</a:t>
+              <a:t>1/3/2022</a:t>
             </a:fld>
             <a:endParaRPr lang="en-US"/>
           </a:p>
@@ -3425,7 +5388,7 @@
           <p:nvPr/>
         </p:nvPicPr>
         <p:blipFill rotWithShape="1">
-          <a:blip r:embed="rId2">
+          <a:blip r:embed="rId3">
             <a:extLst>
               <a:ext uri="{28A0092B-C50C-407E-A947-70E740481C1C}">
                 <a14:useLocalDpi xmlns:a14="http://schemas.microsoft.com/office/drawing/2010/main" val="0"/>
@@ -3546,7 +5509,7 @@
         <p:spPr>
           <a:xfrm>
             <a:off x="477980" y="1122363"/>
-            <a:ext cx="5389419" cy="3204134"/>
+            <a:ext cx="6777062" cy="3204134"/>
           </a:xfrm>
         </p:spPr>
         <p:txBody>
@@ -3561,13 +5524,21 @@
                 <a:solidFill>
                   <a:srgbClr val="800000"/>
                 </a:solidFill>
+                <a:latin typeface="Courier New" panose="02070309020205020404" pitchFamily="49" charset="0"/>
+                <a:cs typeface="Courier New" panose="02070309020205020404" pitchFamily="49" charset="0"/>
               </a:rPr>
               <a:t>CVE-2016-5195</a:t>
             </a:r>
             <a:br>
-              <a:rPr lang="en-US" sz="6600" b="1" dirty="0"/>
+              <a:rPr lang="en-US" sz="6600" b="1" dirty="0">
+                <a:latin typeface="Courier New" panose="02070309020205020404" pitchFamily="49" charset="0"/>
+                <a:cs typeface="Courier New" panose="02070309020205020404" pitchFamily="49" charset="0"/>
+              </a:rPr>
             </a:br>
-            <a:endParaRPr lang="en-US" sz="5400" dirty="0"/>
+            <a:endParaRPr lang="en-US" sz="5400" dirty="0">
+              <a:latin typeface="Courier New" panose="02070309020205020404" pitchFamily="49" charset="0"/>
+              <a:cs typeface="Courier New" panose="02070309020205020404" pitchFamily="49" charset="0"/>
+            </a:endParaRPr>
           </a:p>
         </p:txBody>
       </p:sp>
@@ -3745,6 +5716,655 @@
 </p:sld>
 </file>
 
+<file path=ppt/slides/slide10.xml><?xml version="1.0" encoding="utf-8"?>
+<p:sld xmlns:a="http://schemas.openxmlformats.org/drawingml/2006/main" xmlns:r="http://schemas.openxmlformats.org/officeDocument/2006/relationships" xmlns:p="http://schemas.openxmlformats.org/presentationml/2006/main">
+  <p:cSld>
+    <p:bg>
+      <p:bgPr>
+        <a:solidFill>
+          <a:schemeClr val="bg1"/>
+        </a:solidFill>
+        <a:effectLst/>
+      </p:bgPr>
+    </p:bg>
+    <p:spTree>
+      <p:nvGrpSpPr>
+        <p:cNvPr id="1" name=""/>
+        <p:cNvGrpSpPr/>
+        <p:nvPr/>
+      </p:nvGrpSpPr>
+      <p:grpSpPr>
+        <a:xfrm>
+          <a:off x="0" y="0"/>
+          <a:ext cx="0" cy="0"/>
+          <a:chOff x="0" y="0"/>
+          <a:chExt cx="0" cy="0"/>
+        </a:xfrm>
+      </p:grpSpPr>
+      <p:sp>
+        <p:nvSpPr>
+          <p:cNvPr id="9" name="Rectangle 8">
+            <a:extLst>
+              <a:ext uri="{FF2B5EF4-FFF2-40B4-BE49-F238E27FC236}">
+                <a16:creationId xmlns:a16="http://schemas.microsoft.com/office/drawing/2014/main" id="{42A5316D-ED2F-4F89-B4B4-8D9240B1A348}"/>
+              </a:ext>
+              <a:ext uri="{C183D7F6-B498-43B3-948B-1728B52AA6E4}">
+                <adec:decorative xmlns:adec="http://schemas.microsoft.com/office/drawing/2017/decorative" val="1"/>
+              </a:ext>
+            </a:extLst>
+          </p:cNvPr>
+          <p:cNvSpPr>
+            <a:spLocks noGrp="1" noRot="1" noChangeAspect="1" noMove="1" noResize="1" noEditPoints="1" noAdjustHandles="1" noChangeArrowheads="1" noChangeShapeType="1" noTextEdit="1"/>
+          </p:cNvSpPr>
+          <p:nvPr>
+            <p:extLst>
+              <p:ext uri="{386F3935-93C4-4BCD-93E2-E3B085C9AB24}">
+                <p16:designElem xmlns:p16="http://schemas.microsoft.com/office/powerpoint/2015/main" val="1"/>
+              </p:ext>
+            </p:extLst>
+          </p:nvPr>
+        </p:nvSpPr>
+        <p:spPr>
+          <a:xfrm>
+            <a:off x="0" y="0"/>
+            <a:ext cx="2013557" cy="6858000"/>
+          </a:xfrm>
+          <a:prstGeom prst="rect">
+            <a:avLst/>
+          </a:prstGeom>
+          <a:solidFill>
+            <a:srgbClr val="4E5E61"/>
+          </a:solidFill>
+          <a:ln>
+            <a:noFill/>
+          </a:ln>
+        </p:spPr>
+        <p:style>
+          <a:lnRef idx="2">
+            <a:schemeClr val="accent1">
+              <a:shade val="50000"/>
+            </a:schemeClr>
+          </a:lnRef>
+          <a:fillRef idx="1">
+            <a:schemeClr val="accent1"/>
+          </a:fillRef>
+          <a:effectRef idx="0">
+            <a:schemeClr val="accent1"/>
+          </a:effectRef>
+          <a:fontRef idx="minor">
+            <a:schemeClr val="lt1"/>
+          </a:fontRef>
+        </p:style>
+        <p:txBody>
+          <a:bodyPr rtlCol="0" anchor="ctr"/>
+          <a:lstStyle/>
+          <a:p>
+            <a:pPr marL="0" marR="0" lvl="0" indent="0" algn="ctr" defTabSz="914400" rtl="0" eaLnBrk="1" fontAlgn="auto" latinLnBrk="0" hangingPunct="1">
+              <a:lnSpc>
+                <a:spcPct val="100000"/>
+              </a:lnSpc>
+              <a:spcBef>
+                <a:spcPts val="0"/>
+              </a:spcBef>
+              <a:spcAft>
+                <a:spcPts val="0"/>
+              </a:spcAft>
+              <a:buClrTx/>
+              <a:buSzTx/>
+              <a:buFontTx/>
+              <a:buNone/>
+              <a:tabLst/>
+              <a:defRPr/>
+            </a:pPr>
+            <a:endParaRPr kumimoji="0" lang="en-US" sz="1800" b="0" i="0" u="none" strike="noStrike" kern="1200" cap="none" spc="0" normalizeH="0" baseline="0" noProof="0">
+              <a:ln>
+                <a:noFill/>
+              </a:ln>
+              <a:solidFill>
+                <a:prstClr val="white"/>
+              </a:solidFill>
+              <a:effectLst/>
+              <a:uLnTx/>
+              <a:uFillTx/>
+              <a:latin typeface="Calibri" panose="020F0502020204030204"/>
+              <a:ea typeface="+mn-ea"/>
+              <a:cs typeface="+mn-cs"/>
+            </a:endParaRPr>
+          </a:p>
+        </p:txBody>
+      </p:sp>
+      <p:sp>
+        <p:nvSpPr>
+          <p:cNvPr id="3" name="מציין מיקום תוכן 2">
+            <a:extLst>
+              <a:ext uri="{FF2B5EF4-FFF2-40B4-BE49-F238E27FC236}">
+                <a16:creationId xmlns:a16="http://schemas.microsoft.com/office/drawing/2014/main" id="{E72E7508-64F9-45B2-809B-848D2CDB68A5}"/>
+              </a:ext>
+            </a:extLst>
+          </p:cNvPr>
+          <p:cNvSpPr>
+            <a:spLocks noGrp="1"/>
+          </p:cNvSpPr>
+          <p:nvPr>
+            <p:ph idx="1"/>
+          </p:nvPr>
+        </p:nvSpPr>
+        <p:spPr>
+          <a:xfrm>
+            <a:off x="4038600" y="4884873"/>
+            <a:ext cx="7188199" cy="1292090"/>
+          </a:xfrm>
+        </p:spPr>
+        <p:txBody>
+          <a:bodyPr>
+            <a:normAutofit/>
+          </a:bodyPr>
+          <a:lstStyle/>
+          <a:p>
+            <a:r>
+              <a:rPr lang="en-US" sz="2400" dirty="0"/>
+              <a:t>Thread</a:t>
+            </a:r>
+            <a:r>
+              <a:rPr lang="he-IL" sz="2400" dirty="0"/>
+              <a:t> ראשון שמריץ את הפונקציה </a:t>
+            </a:r>
+            <a:r>
+              <a:rPr lang="en-US" sz="2400" dirty="0" err="1"/>
+              <a:t>madviceThread</a:t>
+            </a:r>
+            <a:endParaRPr lang="he-IL" sz="2400" dirty="0"/>
+          </a:p>
+          <a:p>
+            <a:r>
+              <a:rPr lang="en-US" sz="2400" dirty="0"/>
+              <a:t>Thread</a:t>
+            </a:r>
+            <a:r>
+              <a:rPr lang="he-IL" sz="2400" dirty="0"/>
+              <a:t> שני שמריץ את הפונקציה </a:t>
+            </a:r>
+            <a:r>
+              <a:rPr lang="en-US" sz="2400" dirty="0" err="1"/>
+              <a:t>procselfmemThread</a:t>
+            </a:r>
+            <a:endParaRPr lang="en-US" sz="2400" dirty="0"/>
+          </a:p>
+        </p:txBody>
+      </p:sp>
+      <p:pic>
+        <p:nvPicPr>
+          <p:cNvPr id="5" name="תמונה 4">
+            <a:extLst>
+              <a:ext uri="{FF2B5EF4-FFF2-40B4-BE49-F238E27FC236}">
+                <a16:creationId xmlns:a16="http://schemas.microsoft.com/office/drawing/2014/main" id="{156B2EF5-20A3-46D5-98F4-EFAD59490F5A}"/>
+              </a:ext>
+            </a:extLst>
+          </p:cNvPr>
+          <p:cNvPicPr/>
+          <p:nvPr/>
+        </p:nvPicPr>
+        <p:blipFill>
+          <a:blip r:embed="rId3"/>
+          <a:stretch>
+            <a:fillRect/>
+          </a:stretch>
+        </p:blipFill>
+        <p:spPr>
+          <a:xfrm>
+            <a:off x="6009924" y="1973128"/>
+            <a:ext cx="5216875" cy="2251210"/>
+          </a:xfrm>
+          <a:prstGeom prst="rect">
+            <a:avLst/>
+          </a:prstGeom>
+        </p:spPr>
+      </p:pic>
+    </p:spTree>
+    <p:extLst>
+      <p:ext uri="{BB962C8B-B14F-4D97-AF65-F5344CB8AC3E}">
+        <p14:creationId xmlns:p14="http://schemas.microsoft.com/office/powerpoint/2010/main" val="3046016971"/>
+      </p:ext>
+    </p:extLst>
+  </p:cSld>
+  <p:clrMapOvr>
+    <a:masterClrMapping/>
+  </p:clrMapOvr>
+</p:sld>
+</file>
+
+<file path=ppt/slides/slide11.xml><?xml version="1.0" encoding="utf-8"?>
+<p:sld xmlns:a="http://schemas.openxmlformats.org/drawingml/2006/main" xmlns:r="http://schemas.openxmlformats.org/officeDocument/2006/relationships" xmlns:p="http://schemas.openxmlformats.org/presentationml/2006/main">
+  <p:cSld>
+    <p:bg>
+      <p:bgPr>
+        <a:solidFill>
+          <a:schemeClr val="bg1"/>
+        </a:solidFill>
+        <a:effectLst/>
+      </p:bgPr>
+    </p:bg>
+    <p:spTree>
+      <p:nvGrpSpPr>
+        <p:cNvPr id="1" name=""/>
+        <p:cNvGrpSpPr/>
+        <p:nvPr/>
+      </p:nvGrpSpPr>
+      <p:grpSpPr>
+        <a:xfrm>
+          <a:off x="0" y="0"/>
+          <a:ext cx="0" cy="0"/>
+          <a:chOff x="0" y="0"/>
+          <a:chExt cx="0" cy="0"/>
+        </a:xfrm>
+      </p:grpSpPr>
+      <p:sp>
+        <p:nvSpPr>
+          <p:cNvPr id="9" name="Rectangle 8">
+            <a:extLst>
+              <a:ext uri="{FF2B5EF4-FFF2-40B4-BE49-F238E27FC236}">
+                <a16:creationId xmlns:a16="http://schemas.microsoft.com/office/drawing/2014/main" id="{42A5316D-ED2F-4F89-B4B4-8D9240B1A348}"/>
+              </a:ext>
+              <a:ext uri="{C183D7F6-B498-43B3-948B-1728B52AA6E4}">
+                <adec:decorative xmlns:adec="http://schemas.microsoft.com/office/drawing/2017/decorative" val="1"/>
+              </a:ext>
+            </a:extLst>
+          </p:cNvPr>
+          <p:cNvSpPr>
+            <a:spLocks noGrp="1" noRot="1" noChangeAspect="1" noMove="1" noResize="1" noEditPoints="1" noAdjustHandles="1" noChangeArrowheads="1" noChangeShapeType="1" noTextEdit="1"/>
+          </p:cNvSpPr>
+          <p:nvPr>
+            <p:extLst>
+              <p:ext uri="{386F3935-93C4-4BCD-93E2-E3B085C9AB24}">
+                <p16:designElem xmlns:p16="http://schemas.microsoft.com/office/powerpoint/2015/main" val="1"/>
+              </p:ext>
+            </p:extLst>
+          </p:nvPr>
+        </p:nvSpPr>
+        <p:spPr>
+          <a:xfrm>
+            <a:off x="0" y="0"/>
+            <a:ext cx="2013557" cy="6858000"/>
+          </a:xfrm>
+          <a:prstGeom prst="rect">
+            <a:avLst/>
+          </a:prstGeom>
+          <a:solidFill>
+            <a:srgbClr val="4E5E61"/>
+          </a:solidFill>
+          <a:ln>
+            <a:noFill/>
+          </a:ln>
+        </p:spPr>
+        <p:style>
+          <a:lnRef idx="2">
+            <a:schemeClr val="accent1">
+              <a:shade val="50000"/>
+            </a:schemeClr>
+          </a:lnRef>
+          <a:fillRef idx="1">
+            <a:schemeClr val="accent1"/>
+          </a:fillRef>
+          <a:effectRef idx="0">
+            <a:schemeClr val="accent1"/>
+          </a:effectRef>
+          <a:fontRef idx="minor">
+            <a:schemeClr val="lt1"/>
+          </a:fontRef>
+        </p:style>
+        <p:txBody>
+          <a:bodyPr rtlCol="0" anchor="ctr"/>
+          <a:lstStyle/>
+          <a:p>
+            <a:pPr marL="0" marR="0" lvl="0" indent="0" algn="ctr" defTabSz="914400" rtl="0" eaLnBrk="1" fontAlgn="auto" latinLnBrk="0" hangingPunct="1">
+              <a:lnSpc>
+                <a:spcPct val="100000"/>
+              </a:lnSpc>
+              <a:spcBef>
+                <a:spcPts val="0"/>
+              </a:spcBef>
+              <a:spcAft>
+                <a:spcPts val="0"/>
+              </a:spcAft>
+              <a:buClrTx/>
+              <a:buSzTx/>
+              <a:buFontTx/>
+              <a:buNone/>
+              <a:tabLst/>
+              <a:defRPr/>
+            </a:pPr>
+            <a:endParaRPr kumimoji="0" lang="en-US" sz="1800" b="0" i="0" u="none" strike="noStrike" kern="1200" cap="none" spc="0" normalizeH="0" baseline="0" noProof="0">
+              <a:ln>
+                <a:noFill/>
+              </a:ln>
+              <a:solidFill>
+                <a:prstClr val="white"/>
+              </a:solidFill>
+              <a:effectLst/>
+              <a:uLnTx/>
+              <a:uFillTx/>
+              <a:latin typeface="Calibri" panose="020F0502020204030204"/>
+              <a:ea typeface="+mn-ea"/>
+              <a:cs typeface="+mn-cs"/>
+            </a:endParaRPr>
+          </a:p>
+        </p:txBody>
+      </p:sp>
+      <p:sp>
+        <p:nvSpPr>
+          <p:cNvPr id="3" name="מציין מיקום תוכן 2">
+            <a:extLst>
+              <a:ext uri="{FF2B5EF4-FFF2-40B4-BE49-F238E27FC236}">
+                <a16:creationId xmlns:a16="http://schemas.microsoft.com/office/drawing/2014/main" id="{E72E7508-64F9-45B2-809B-848D2CDB68A5}"/>
+              </a:ext>
+            </a:extLst>
+          </p:cNvPr>
+          <p:cNvSpPr>
+            <a:spLocks noGrp="1"/>
+          </p:cNvSpPr>
+          <p:nvPr>
+            <p:ph idx="1"/>
+          </p:nvPr>
+        </p:nvSpPr>
+        <p:spPr>
+          <a:xfrm>
+            <a:off x="4038600" y="4884873"/>
+            <a:ext cx="7188199" cy="1292090"/>
+          </a:xfrm>
+        </p:spPr>
+        <p:txBody>
+          <a:bodyPr>
+            <a:normAutofit lnSpcReduction="10000"/>
+          </a:bodyPr>
+          <a:lstStyle/>
+          <a:p>
+            <a:r>
+              <a:rPr lang="he-IL" sz="2400" dirty="0"/>
+              <a:t>נפתח הקובץ </a:t>
+            </a:r>
+            <a:r>
+              <a:rPr lang="en-US" sz="2400" dirty="0"/>
+              <a:t>/proc/self/mem</a:t>
+            </a:r>
+            <a:r>
+              <a:rPr lang="he-IL" sz="2400" dirty="0"/>
+              <a:t> לכתיבה וקריאה.</a:t>
+            </a:r>
+          </a:p>
+          <a:p>
+            <a:r>
+              <a:rPr lang="he-IL" sz="2400" dirty="0"/>
+              <a:t>נעשה </a:t>
+            </a:r>
+            <a:r>
+              <a:rPr lang="en-US" sz="2400" dirty="0" err="1"/>
+              <a:t>lseek</a:t>
+            </a:r>
+            <a:r>
+              <a:rPr lang="he-IL" sz="2400" dirty="0"/>
+              <a:t> אל המיפוי של הקובץ.</a:t>
+            </a:r>
+          </a:p>
+          <a:p>
+            <a:r>
+              <a:rPr lang="he-IL" sz="2400" dirty="0"/>
+              <a:t>נעשית כתיבה לכתובות הממופות.</a:t>
+            </a:r>
+            <a:endParaRPr lang="en-US" sz="2400" dirty="0"/>
+          </a:p>
+        </p:txBody>
+      </p:sp>
+      <p:pic>
+        <p:nvPicPr>
+          <p:cNvPr id="2" name="תמונה 1">
+            <a:extLst>
+              <a:ext uri="{FF2B5EF4-FFF2-40B4-BE49-F238E27FC236}">
+                <a16:creationId xmlns:a16="http://schemas.microsoft.com/office/drawing/2014/main" id="{44679EDA-A744-4519-B4AB-107D5E3A8B1A}"/>
+              </a:ext>
+            </a:extLst>
+          </p:cNvPr>
+          <p:cNvPicPr>
+            <a:picLocks noChangeAspect="1"/>
+          </p:cNvPicPr>
+          <p:nvPr/>
+        </p:nvPicPr>
+        <p:blipFill>
+          <a:blip r:embed="rId3"/>
+          <a:stretch>
+            <a:fillRect/>
+          </a:stretch>
+        </p:blipFill>
+        <p:spPr>
+          <a:xfrm>
+            <a:off x="5694067" y="681037"/>
+            <a:ext cx="5532732" cy="3938260"/>
+          </a:xfrm>
+          <a:prstGeom prst="rect">
+            <a:avLst/>
+          </a:prstGeom>
+        </p:spPr>
+      </p:pic>
+    </p:spTree>
+    <p:extLst>
+      <p:ext uri="{BB962C8B-B14F-4D97-AF65-F5344CB8AC3E}">
+        <p14:creationId xmlns:p14="http://schemas.microsoft.com/office/powerpoint/2010/main" val="2209990850"/>
+      </p:ext>
+    </p:extLst>
+  </p:cSld>
+  <p:clrMapOvr>
+    <a:masterClrMapping/>
+  </p:clrMapOvr>
+</p:sld>
+</file>
+
+<file path=ppt/slides/slide12.xml><?xml version="1.0" encoding="utf-8"?>
+<p:sld xmlns:a="http://schemas.openxmlformats.org/drawingml/2006/main" xmlns:r="http://schemas.openxmlformats.org/officeDocument/2006/relationships" xmlns:p="http://schemas.openxmlformats.org/presentationml/2006/main">
+  <p:cSld>
+    <p:bg>
+      <p:bgPr>
+        <a:solidFill>
+          <a:schemeClr val="bg1"/>
+        </a:solidFill>
+        <a:effectLst/>
+      </p:bgPr>
+    </p:bg>
+    <p:spTree>
+      <p:nvGrpSpPr>
+        <p:cNvPr id="1" name=""/>
+        <p:cNvGrpSpPr/>
+        <p:nvPr/>
+      </p:nvGrpSpPr>
+      <p:grpSpPr>
+        <a:xfrm>
+          <a:off x="0" y="0"/>
+          <a:ext cx="0" cy="0"/>
+          <a:chOff x="0" y="0"/>
+          <a:chExt cx="0" cy="0"/>
+        </a:xfrm>
+      </p:grpSpPr>
+      <p:sp>
+        <p:nvSpPr>
+          <p:cNvPr id="9" name="Rectangle 8">
+            <a:extLst>
+              <a:ext uri="{FF2B5EF4-FFF2-40B4-BE49-F238E27FC236}">
+                <a16:creationId xmlns:a16="http://schemas.microsoft.com/office/drawing/2014/main" id="{42A5316D-ED2F-4F89-B4B4-8D9240B1A348}"/>
+              </a:ext>
+              <a:ext uri="{C183D7F6-B498-43B3-948B-1728B52AA6E4}">
+                <adec:decorative xmlns:adec="http://schemas.microsoft.com/office/drawing/2017/decorative" val="1"/>
+              </a:ext>
+            </a:extLst>
+          </p:cNvPr>
+          <p:cNvSpPr>
+            <a:spLocks noGrp="1" noRot="1" noChangeAspect="1" noMove="1" noResize="1" noEditPoints="1" noAdjustHandles="1" noChangeArrowheads="1" noChangeShapeType="1" noTextEdit="1"/>
+          </p:cNvSpPr>
+          <p:nvPr>
+            <p:extLst>
+              <p:ext uri="{386F3935-93C4-4BCD-93E2-E3B085C9AB24}">
+                <p16:designElem xmlns:p16="http://schemas.microsoft.com/office/powerpoint/2015/main" val="1"/>
+              </p:ext>
+            </p:extLst>
+          </p:nvPr>
+        </p:nvSpPr>
+        <p:spPr>
+          <a:xfrm>
+            <a:off x="0" y="0"/>
+            <a:ext cx="2013557" cy="6858000"/>
+          </a:xfrm>
+          <a:prstGeom prst="rect">
+            <a:avLst/>
+          </a:prstGeom>
+          <a:solidFill>
+            <a:srgbClr val="4E5E61"/>
+          </a:solidFill>
+          <a:ln>
+            <a:noFill/>
+          </a:ln>
+        </p:spPr>
+        <p:style>
+          <a:lnRef idx="2">
+            <a:schemeClr val="accent1">
+              <a:shade val="50000"/>
+            </a:schemeClr>
+          </a:lnRef>
+          <a:fillRef idx="1">
+            <a:schemeClr val="accent1"/>
+          </a:fillRef>
+          <a:effectRef idx="0">
+            <a:schemeClr val="accent1"/>
+          </a:effectRef>
+          <a:fontRef idx="minor">
+            <a:schemeClr val="lt1"/>
+          </a:fontRef>
+        </p:style>
+        <p:txBody>
+          <a:bodyPr rtlCol="0" anchor="ctr"/>
+          <a:lstStyle/>
+          <a:p>
+            <a:pPr marL="0" marR="0" lvl="0" indent="0" algn="ctr" defTabSz="914400" rtl="0" eaLnBrk="1" fontAlgn="auto" latinLnBrk="0" hangingPunct="1">
+              <a:lnSpc>
+                <a:spcPct val="100000"/>
+              </a:lnSpc>
+              <a:spcBef>
+                <a:spcPts val="0"/>
+              </a:spcBef>
+              <a:spcAft>
+                <a:spcPts val="0"/>
+              </a:spcAft>
+              <a:buClrTx/>
+              <a:buSzTx/>
+              <a:buFontTx/>
+              <a:buNone/>
+              <a:tabLst/>
+              <a:defRPr/>
+            </a:pPr>
+            <a:endParaRPr kumimoji="0" lang="en-US" sz="1800" b="0" i="0" u="none" strike="noStrike" kern="1200" cap="none" spc="0" normalizeH="0" baseline="0" noProof="0">
+              <a:ln>
+                <a:noFill/>
+              </a:ln>
+              <a:solidFill>
+                <a:prstClr val="white"/>
+              </a:solidFill>
+              <a:effectLst/>
+              <a:uLnTx/>
+              <a:uFillTx/>
+              <a:latin typeface="Calibri" panose="020F0502020204030204"/>
+              <a:ea typeface="+mn-ea"/>
+              <a:cs typeface="+mn-cs"/>
+            </a:endParaRPr>
+          </a:p>
+        </p:txBody>
+      </p:sp>
+      <p:sp>
+        <p:nvSpPr>
+          <p:cNvPr id="3" name="מציין מיקום תוכן 2">
+            <a:extLst>
+              <a:ext uri="{FF2B5EF4-FFF2-40B4-BE49-F238E27FC236}">
+                <a16:creationId xmlns:a16="http://schemas.microsoft.com/office/drawing/2014/main" id="{E72E7508-64F9-45B2-809B-848D2CDB68A5}"/>
+              </a:ext>
+            </a:extLst>
+          </p:cNvPr>
+          <p:cNvSpPr>
+            <a:spLocks noGrp="1"/>
+          </p:cNvSpPr>
+          <p:nvPr>
+            <p:ph idx="1"/>
+          </p:nvPr>
+        </p:nvSpPr>
+        <p:spPr>
+          <a:xfrm>
+            <a:off x="3686630" y="4884873"/>
+            <a:ext cx="7540170" cy="1292090"/>
+          </a:xfrm>
+        </p:spPr>
+        <p:txBody>
+          <a:bodyPr>
+            <a:normAutofit/>
+          </a:bodyPr>
+          <a:lstStyle/>
+          <a:p>
+            <a:r>
+              <a:rPr lang="en-US" sz="2400" dirty="0" err="1"/>
+              <a:t>madvice</a:t>
+            </a:r>
+            <a:r>
+              <a:rPr lang="he-IL" sz="2400" dirty="0"/>
+              <a:t> על הקובץ הממופה עם הדגל </a:t>
+            </a:r>
+            <a:r>
+              <a:rPr lang="en-US" sz="2400" dirty="0"/>
+              <a:t>MADV_DONTNEED</a:t>
+            </a:r>
+            <a:r>
+              <a:rPr lang="he-IL" sz="2400" dirty="0"/>
+              <a:t>.</a:t>
+            </a:r>
+            <a:endParaRPr lang="en-US" sz="2400" dirty="0"/>
+          </a:p>
+        </p:txBody>
+      </p:sp>
+      <p:pic>
+        <p:nvPicPr>
+          <p:cNvPr id="5" name="תמונה 4">
+            <a:extLst>
+              <a:ext uri="{FF2B5EF4-FFF2-40B4-BE49-F238E27FC236}">
+                <a16:creationId xmlns:a16="http://schemas.microsoft.com/office/drawing/2014/main" id="{B7445300-A399-427C-A420-E02A774BD484}"/>
+              </a:ext>
+            </a:extLst>
+          </p:cNvPr>
+          <p:cNvPicPr>
+            <a:picLocks noChangeAspect="1"/>
+          </p:cNvPicPr>
+          <p:nvPr/>
+        </p:nvPicPr>
+        <p:blipFill>
+          <a:blip r:embed="rId3"/>
+          <a:stretch>
+            <a:fillRect/>
+          </a:stretch>
+        </p:blipFill>
+        <p:spPr>
+          <a:xfrm>
+            <a:off x="4672684" y="1354592"/>
+            <a:ext cx="6554115" cy="3219899"/>
+          </a:xfrm>
+          <a:prstGeom prst="rect">
+            <a:avLst/>
+          </a:prstGeom>
+        </p:spPr>
+      </p:pic>
+    </p:spTree>
+    <p:extLst>
+      <p:ext uri="{BB962C8B-B14F-4D97-AF65-F5344CB8AC3E}">
+        <p14:creationId xmlns:p14="http://schemas.microsoft.com/office/powerpoint/2010/main" val="2164165516"/>
+      </p:ext>
+    </p:extLst>
+  </p:cSld>
+  <p:clrMapOvr>
+    <a:masterClrMapping/>
+  </p:clrMapOvr>
+</p:sld>
+</file>
+
 <file path=ppt/slides/slide2.xml><?xml version="1.0" encoding="utf-8"?>
 <p:sld xmlns:a="http://schemas.openxmlformats.org/drawingml/2006/main" xmlns:r="http://schemas.openxmlformats.org/officeDocument/2006/relationships" xmlns:p="http://schemas.openxmlformats.org/presentationml/2006/main">
   <p:cSld>
@@ -3772,30 +6392,43 @@
       </p:grpSpPr>
       <p:pic>
         <p:nvPicPr>
-          <p:cNvPr id="4" name="מציין מיקום תוכן 3">
-            <a:extLst>
-              <a:ext uri="{FF2B5EF4-FFF2-40B4-BE49-F238E27FC236}">
-                <a16:creationId xmlns:a16="http://schemas.microsoft.com/office/drawing/2014/main" id="{0A98E239-BC2B-4489-BB0D-C5C3E48DB95D}"/>
+          <p:cNvPr id="22" name="מציין מיקום תוכן 21">
+            <a:extLst>
+              <a:ext uri="{FF2B5EF4-FFF2-40B4-BE49-F238E27FC236}">
+                <a16:creationId xmlns:a16="http://schemas.microsoft.com/office/drawing/2014/main" id="{D14FE0EB-1E9F-42F6-8E05-D031A79023D4}"/>
               </a:ext>
             </a:extLst>
           </p:cNvPr>
           <p:cNvPicPr>
-            <a:picLocks noGrp="1"/>
+            <a:picLocks noGrp="1" noChangeAspect="1"/>
           </p:cNvPicPr>
           <p:nvPr>
             <p:ph idx="1"/>
           </p:nvPr>
         </p:nvPicPr>
         <p:blipFill>
-          <a:blip r:embed="rId2"/>
+          <a:blip r:embed="rId2">
+            <a:duotone>
+              <a:prstClr val="black"/>
+              <a:srgbClr val="D9C3A5">
+                <a:tint val="50000"/>
+                <a:satMod val="180000"/>
+              </a:srgbClr>
+            </a:duotone>
+            <a:extLst>
+              <a:ext uri="{28A0092B-C50C-407E-A947-70E740481C1C}">
+                <a14:useLocalDpi xmlns:a14="http://schemas.microsoft.com/office/drawing/2010/main" val="0"/>
+              </a:ext>
+            </a:extLst>
+          </a:blip>
           <a:stretch>
             <a:fillRect/>
           </a:stretch>
         </p:blipFill>
         <p:spPr>
           <a:xfrm>
-            <a:off x="2948505" y="643466"/>
-            <a:ext cx="6294990" cy="5571067"/>
+            <a:off x="1" y="0"/>
+            <a:ext cx="12192000" cy="6858000"/>
           </a:xfrm>
           <a:prstGeom prst="rect">
             <a:avLst/>
@@ -3805,7 +6438,7 @@
     </p:spTree>
     <p:extLst>
       <p:ext uri="{BB962C8B-B14F-4D97-AF65-F5344CB8AC3E}">
-        <p14:creationId xmlns:p14="http://schemas.microsoft.com/office/powerpoint/2010/main" val="2337218056"/>
+        <p14:creationId xmlns:p14="http://schemas.microsoft.com/office/powerpoint/2010/main" val="3307872458"/>
       </p:ext>
     </p:extLst>
   </p:cSld>
@@ -3840,12 +6473,362 @@
           <a:chExt cx="0" cy="0"/>
         </a:xfrm>
       </p:grpSpPr>
-      <p:sp>
-        <p:nvSpPr>
-          <p:cNvPr id="10" name="Rectangle 9">
-            <a:extLst>
-              <a:ext uri="{FF2B5EF4-FFF2-40B4-BE49-F238E27FC236}">
-                <a16:creationId xmlns:a16="http://schemas.microsoft.com/office/drawing/2014/main" id="{01D0AF59-99C3-4251-AB9A-C966C6AD4400}"/>
+      <p:pic>
+        <p:nvPicPr>
+          <p:cNvPr id="8" name="תמונה 4">
+            <a:extLst>
+              <a:ext uri="{FF2B5EF4-FFF2-40B4-BE49-F238E27FC236}">
+                <a16:creationId xmlns:a16="http://schemas.microsoft.com/office/drawing/2014/main" id="{A771BEEF-8297-45F0-BD7A-AC4DCD76BC72}"/>
+              </a:ext>
+            </a:extLst>
+          </p:cNvPr>
+          <p:cNvPicPr>
+            <a:picLocks noGrp="1"/>
+          </p:cNvPicPr>
+          <p:nvPr>
+            <p:ph idx="1"/>
+          </p:nvPr>
+        </p:nvPicPr>
+        <p:blipFill>
+          <a:blip r:embed="rId3"/>
+          <a:stretch>
+            <a:fillRect/>
+          </a:stretch>
+        </p:blipFill>
+        <p:spPr>
+          <a:xfrm>
+            <a:off x="2948505" y="643466"/>
+            <a:ext cx="6294990" cy="5571067"/>
+          </a:xfrm>
+          <a:prstGeom prst="rect">
+            <a:avLst/>
+          </a:prstGeom>
+        </p:spPr>
+      </p:pic>
+    </p:spTree>
+    <p:extLst>
+      <p:ext uri="{BB962C8B-B14F-4D97-AF65-F5344CB8AC3E}">
+        <p14:creationId xmlns:p14="http://schemas.microsoft.com/office/powerpoint/2010/main" val="2337218056"/>
+      </p:ext>
+    </p:extLst>
+  </p:cSld>
+  <p:clrMapOvr>
+    <a:masterClrMapping/>
+  </p:clrMapOvr>
+</p:sld>
+</file>
+
+<file path=ppt/slides/slide4.xml><?xml version="1.0" encoding="utf-8"?>
+<p:sld xmlns:a="http://schemas.openxmlformats.org/drawingml/2006/main" xmlns:r="http://schemas.openxmlformats.org/officeDocument/2006/relationships" xmlns:p="http://schemas.openxmlformats.org/presentationml/2006/main">
+  <p:cSld>
+    <p:bg>
+      <p:bgPr>
+        <a:solidFill>
+          <a:schemeClr val="bg1"/>
+        </a:solidFill>
+        <a:effectLst/>
+      </p:bgPr>
+    </p:bg>
+    <p:spTree>
+      <p:nvGrpSpPr>
+        <p:cNvPr id="1" name=""/>
+        <p:cNvGrpSpPr/>
+        <p:nvPr/>
+      </p:nvGrpSpPr>
+      <p:grpSpPr>
+        <a:xfrm>
+          <a:off x="0" y="0"/>
+          <a:ext cx="0" cy="0"/>
+          <a:chOff x="0" y="0"/>
+          <a:chExt cx="0" cy="0"/>
+        </a:xfrm>
+      </p:grpSpPr>
+      <p:pic>
+        <p:nvPicPr>
+          <p:cNvPr id="15" name="תמונה 3">
+            <a:extLst>
+              <a:ext uri="{FF2B5EF4-FFF2-40B4-BE49-F238E27FC236}">
+                <a16:creationId xmlns:a16="http://schemas.microsoft.com/office/drawing/2014/main" id="{9454A8CF-9187-4CBA-B5EF-6BE8531524F2}"/>
+              </a:ext>
+            </a:extLst>
+          </p:cNvPr>
+          <p:cNvPicPr>
+            <a:picLocks noGrp="1" noChangeAspect="1"/>
+          </p:cNvPicPr>
+          <p:nvPr>
+            <p:ph idx="1"/>
+          </p:nvPr>
+        </p:nvPicPr>
+        <p:blipFill>
+          <a:blip r:embed="rId3"/>
+          <a:stretch>
+            <a:fillRect/>
+          </a:stretch>
+        </p:blipFill>
+        <p:spPr>
+          <a:xfrm>
+            <a:off x="2948505" y="643466"/>
+            <a:ext cx="6294990" cy="5571067"/>
+          </a:xfrm>
+          <a:prstGeom prst="rect">
+            <a:avLst/>
+          </a:prstGeom>
+        </p:spPr>
+      </p:pic>
+    </p:spTree>
+    <p:extLst>
+      <p:ext uri="{BB962C8B-B14F-4D97-AF65-F5344CB8AC3E}">
+        <p14:creationId xmlns:p14="http://schemas.microsoft.com/office/powerpoint/2010/main" val="2544582434"/>
+      </p:ext>
+    </p:extLst>
+  </p:cSld>
+  <p:clrMapOvr>
+    <a:masterClrMapping/>
+  </p:clrMapOvr>
+</p:sld>
+</file>
+
+<file path=ppt/slides/slide5.xml><?xml version="1.0" encoding="utf-8"?>
+<p:sld xmlns:a="http://schemas.openxmlformats.org/drawingml/2006/main" xmlns:r="http://schemas.openxmlformats.org/officeDocument/2006/relationships" xmlns:p="http://schemas.openxmlformats.org/presentationml/2006/main">
+  <p:cSld>
+    <p:bg>
+      <p:bgPr>
+        <a:solidFill>
+          <a:schemeClr val="bg1"/>
+        </a:solidFill>
+        <a:effectLst/>
+      </p:bgPr>
+    </p:bg>
+    <p:spTree>
+      <p:nvGrpSpPr>
+        <p:cNvPr id="1" name=""/>
+        <p:cNvGrpSpPr/>
+        <p:nvPr/>
+      </p:nvGrpSpPr>
+      <p:grpSpPr>
+        <a:xfrm>
+          <a:off x="0" y="0"/>
+          <a:ext cx="0" cy="0"/>
+          <a:chOff x="0" y="0"/>
+          <a:chExt cx="0" cy="0"/>
+        </a:xfrm>
+      </p:grpSpPr>
+      <p:pic>
+        <p:nvPicPr>
+          <p:cNvPr id="7" name="תמונה 3">
+            <a:extLst>
+              <a:ext uri="{FF2B5EF4-FFF2-40B4-BE49-F238E27FC236}">
+                <a16:creationId xmlns:a16="http://schemas.microsoft.com/office/drawing/2014/main" id="{84878982-8092-4D13-AA97-3EEF3CF19743}"/>
+              </a:ext>
+            </a:extLst>
+          </p:cNvPr>
+          <p:cNvPicPr>
+            <a:picLocks noGrp="1"/>
+          </p:cNvPicPr>
+          <p:nvPr>
+            <p:ph idx="1"/>
+          </p:nvPr>
+        </p:nvPicPr>
+        <p:blipFill>
+          <a:blip r:embed="rId3"/>
+          <a:stretch>
+            <a:fillRect/>
+          </a:stretch>
+        </p:blipFill>
+        <p:spPr>
+          <a:xfrm>
+            <a:off x="2948505" y="643466"/>
+            <a:ext cx="6294990" cy="5571067"/>
+          </a:xfrm>
+          <a:prstGeom prst="rect">
+            <a:avLst/>
+          </a:prstGeom>
+        </p:spPr>
+      </p:pic>
+    </p:spTree>
+    <p:extLst>
+      <p:ext uri="{BB962C8B-B14F-4D97-AF65-F5344CB8AC3E}">
+        <p14:creationId xmlns:p14="http://schemas.microsoft.com/office/powerpoint/2010/main" val="1803751641"/>
+      </p:ext>
+    </p:extLst>
+  </p:cSld>
+  <p:clrMapOvr>
+    <a:masterClrMapping/>
+  </p:clrMapOvr>
+</p:sld>
+</file>
+
+<file path=ppt/slides/slide6.xml><?xml version="1.0" encoding="utf-8"?>
+<p:sld xmlns:a="http://schemas.openxmlformats.org/drawingml/2006/main" xmlns:r="http://schemas.openxmlformats.org/officeDocument/2006/relationships" xmlns:p="http://schemas.openxmlformats.org/presentationml/2006/main">
+  <p:cSld>
+    <p:bg>
+      <p:bgPr>
+        <a:solidFill>
+          <a:schemeClr val="bg1"/>
+        </a:solidFill>
+        <a:effectLst/>
+      </p:bgPr>
+    </p:bg>
+    <p:spTree>
+      <p:nvGrpSpPr>
+        <p:cNvPr id="1" name=""/>
+        <p:cNvGrpSpPr/>
+        <p:nvPr/>
+      </p:nvGrpSpPr>
+      <p:grpSpPr>
+        <a:xfrm>
+          <a:off x="0" y="0"/>
+          <a:ext cx="0" cy="0"/>
+          <a:chOff x="0" y="0"/>
+          <a:chExt cx="0" cy="0"/>
+        </a:xfrm>
+      </p:grpSpPr>
+      <p:pic>
+        <p:nvPicPr>
+          <p:cNvPr id="4" name="מציין מיקום תוכן 3">
+            <a:extLst>
+              <a:ext uri="{FF2B5EF4-FFF2-40B4-BE49-F238E27FC236}">
+                <a16:creationId xmlns:a16="http://schemas.microsoft.com/office/drawing/2014/main" id="{DF1325A9-6D52-45D4-B4CD-C5DF7E6F2DD1}"/>
+              </a:ext>
+            </a:extLst>
+          </p:cNvPr>
+          <p:cNvPicPr>
+            <a:picLocks noGrp="1"/>
+          </p:cNvPicPr>
+          <p:nvPr>
+            <p:ph idx="1"/>
+          </p:nvPr>
+        </p:nvPicPr>
+        <p:blipFill>
+          <a:blip r:embed="rId3"/>
+          <a:stretch>
+            <a:fillRect/>
+          </a:stretch>
+        </p:blipFill>
+        <p:spPr>
+          <a:xfrm>
+            <a:off x="2948505" y="643466"/>
+            <a:ext cx="6294990" cy="5571067"/>
+          </a:xfrm>
+          <a:prstGeom prst="rect">
+            <a:avLst/>
+          </a:prstGeom>
+        </p:spPr>
+      </p:pic>
+    </p:spTree>
+    <p:extLst>
+      <p:ext uri="{BB962C8B-B14F-4D97-AF65-F5344CB8AC3E}">
+        <p14:creationId xmlns:p14="http://schemas.microsoft.com/office/powerpoint/2010/main" val="682954079"/>
+      </p:ext>
+    </p:extLst>
+  </p:cSld>
+  <p:clrMapOvr>
+    <a:masterClrMapping/>
+  </p:clrMapOvr>
+</p:sld>
+</file>
+
+<file path=ppt/slides/slide7.xml><?xml version="1.0" encoding="utf-8"?>
+<p:sld xmlns:a="http://schemas.openxmlformats.org/drawingml/2006/main" xmlns:r="http://schemas.openxmlformats.org/officeDocument/2006/relationships" xmlns:p="http://schemas.openxmlformats.org/presentationml/2006/main">
+  <p:cSld>
+    <p:bg>
+      <p:bgPr>
+        <a:solidFill>
+          <a:schemeClr val="bg1"/>
+        </a:solidFill>
+        <a:effectLst/>
+      </p:bgPr>
+    </p:bg>
+    <p:spTree>
+      <p:nvGrpSpPr>
+        <p:cNvPr id="1" name=""/>
+        <p:cNvGrpSpPr/>
+        <p:nvPr/>
+      </p:nvGrpSpPr>
+      <p:grpSpPr>
+        <a:xfrm>
+          <a:off x="0" y="0"/>
+          <a:ext cx="0" cy="0"/>
+          <a:chOff x="0" y="0"/>
+          <a:chExt cx="0" cy="0"/>
+        </a:xfrm>
+      </p:grpSpPr>
+      <p:pic>
+        <p:nvPicPr>
+          <p:cNvPr id="4" name="מציין מיקום תוכן 3">
+            <a:extLst>
+              <a:ext uri="{FF2B5EF4-FFF2-40B4-BE49-F238E27FC236}">
+                <a16:creationId xmlns:a16="http://schemas.microsoft.com/office/drawing/2014/main" id="{C7E87EBF-2A21-4EEB-B874-9EFE1622C3C3}"/>
+              </a:ext>
+            </a:extLst>
+          </p:cNvPr>
+          <p:cNvPicPr>
+            <a:picLocks noGrp="1"/>
+          </p:cNvPicPr>
+          <p:nvPr>
+            <p:ph idx="1"/>
+          </p:nvPr>
+        </p:nvPicPr>
+        <p:blipFill>
+          <a:blip r:embed="rId3"/>
+          <a:stretch>
+            <a:fillRect/>
+          </a:stretch>
+        </p:blipFill>
+        <p:spPr>
+          <a:xfrm>
+            <a:off x="2948505" y="643466"/>
+            <a:ext cx="6294990" cy="5571067"/>
+          </a:xfrm>
+          <a:prstGeom prst="rect">
+            <a:avLst/>
+          </a:prstGeom>
+        </p:spPr>
+      </p:pic>
+    </p:spTree>
+    <p:extLst>
+      <p:ext uri="{BB962C8B-B14F-4D97-AF65-F5344CB8AC3E}">
+        <p14:creationId xmlns:p14="http://schemas.microsoft.com/office/powerpoint/2010/main" val="1918854406"/>
+      </p:ext>
+    </p:extLst>
+  </p:cSld>
+  <p:clrMapOvr>
+    <a:masterClrMapping/>
+  </p:clrMapOvr>
+</p:sld>
+</file>
+
+<file path=ppt/slides/slide8.xml><?xml version="1.0" encoding="utf-8"?>
+<p:sld xmlns:a="http://schemas.openxmlformats.org/drawingml/2006/main" xmlns:r="http://schemas.openxmlformats.org/officeDocument/2006/relationships" xmlns:p="http://schemas.openxmlformats.org/presentationml/2006/main">
+  <p:cSld>
+    <p:bg>
+      <p:bgPr>
+        <a:solidFill>
+          <a:schemeClr val="bg1"/>
+        </a:solidFill>
+        <a:effectLst/>
+      </p:bgPr>
+    </p:bg>
+    <p:spTree>
+      <p:nvGrpSpPr>
+        <p:cNvPr id="1" name=""/>
+        <p:cNvGrpSpPr/>
+        <p:nvPr/>
+      </p:nvGrpSpPr>
+      <p:grpSpPr>
+        <a:xfrm>
+          <a:off x="0" y="0"/>
+          <a:ext cx="0" cy="0"/>
+          <a:chOff x="0" y="0"/>
+          <a:chExt cx="0" cy="0"/>
+        </a:xfrm>
+      </p:grpSpPr>
+      <p:sp>
+        <p:nvSpPr>
+          <p:cNvPr id="27" name="Rectangle 26">
+            <a:extLst>
+              <a:ext uri="{FF2B5EF4-FFF2-40B4-BE49-F238E27FC236}">
+                <a16:creationId xmlns:a16="http://schemas.microsoft.com/office/drawing/2014/main" id="{42A5316D-ED2F-4F89-B4B4-8D9240B1A348}"/>
               </a:ext>
               <a:ext uri="{C183D7F6-B498-43B3-948B-1728B52AA6E4}">
                 <adec:decorative xmlns:adec="http://schemas.microsoft.com/office/drawing/2017/decorative" val="1"/>
@@ -3866,13 +6849,13 @@
         <p:spPr>
           <a:xfrm>
             <a:off x="0" y="0"/>
-            <a:ext cx="12192000" cy="6858000"/>
+            <a:ext cx="2013557" cy="6858000"/>
           </a:xfrm>
           <a:prstGeom prst="rect">
             <a:avLst/>
           </a:prstGeom>
           <a:solidFill>
-            <a:schemeClr val="bg2"/>
+            <a:srgbClr val="3E5162"/>
           </a:solidFill>
           <a:ln>
             <a:noFill/>
@@ -3898,17 +6881,153 @@
           <a:bodyPr rtlCol="0" anchor="ctr"/>
           <a:lstStyle/>
           <a:p>
-            <a:pPr algn="ctr"/>
-            <a:endParaRPr lang="en-US"/>
-          </a:p>
-        </p:txBody>
-      </p:sp>
-      <p:sp>
-        <p:nvSpPr>
-          <p:cNvPr id="12" name="Rectangle 11">
-            <a:extLst>
-              <a:ext uri="{FF2B5EF4-FFF2-40B4-BE49-F238E27FC236}">
-                <a16:creationId xmlns:a16="http://schemas.microsoft.com/office/drawing/2014/main" id="{1855405F-37A2-4869-9154-F8BE3BECE6C3}"/>
+            <a:pPr marL="0" marR="0" lvl="0" indent="0" algn="ctr" defTabSz="914400" rtl="0" eaLnBrk="1" fontAlgn="auto" latinLnBrk="0" hangingPunct="1">
+              <a:lnSpc>
+                <a:spcPct val="100000"/>
+              </a:lnSpc>
+              <a:spcBef>
+                <a:spcPts val="0"/>
+              </a:spcBef>
+              <a:spcAft>
+                <a:spcPts val="0"/>
+              </a:spcAft>
+              <a:buClrTx/>
+              <a:buSzTx/>
+              <a:buFontTx/>
+              <a:buNone/>
+              <a:tabLst/>
+              <a:defRPr/>
+            </a:pPr>
+            <a:endParaRPr kumimoji="0" lang="en-US" sz="1800" b="0" i="0" u="none" strike="noStrike" kern="1200" cap="none" spc="0" normalizeH="0" baseline="0" noProof="0">
+              <a:ln>
+                <a:noFill/>
+              </a:ln>
+              <a:solidFill>
+                <a:prstClr val="white"/>
+              </a:solidFill>
+              <a:effectLst/>
+              <a:uLnTx/>
+              <a:uFillTx/>
+              <a:latin typeface="Calibri" panose="020F0502020204030204"/>
+              <a:ea typeface="+mn-ea"/>
+              <a:cs typeface="+mn-cs"/>
+            </a:endParaRPr>
+          </a:p>
+        </p:txBody>
+      </p:sp>
+      <p:pic>
+        <p:nvPicPr>
+          <p:cNvPr id="7" name="תמונה 6">
+            <a:extLst>
+              <a:ext uri="{FF2B5EF4-FFF2-40B4-BE49-F238E27FC236}">
+                <a16:creationId xmlns:a16="http://schemas.microsoft.com/office/drawing/2014/main" id="{E33E55D6-4F29-4932-88D5-B2948B842B8F}"/>
+              </a:ext>
+            </a:extLst>
+          </p:cNvPr>
+          <p:cNvPicPr>
+            <a:picLocks noChangeAspect="1"/>
+          </p:cNvPicPr>
+          <p:nvPr/>
+        </p:nvPicPr>
+        <p:blipFill>
+          <a:blip r:embed="rId3"/>
+          <a:stretch>
+            <a:fillRect/>
+          </a:stretch>
+        </p:blipFill>
+        <p:spPr>
+          <a:xfrm>
+            <a:off x="4038600" y="1421232"/>
+            <a:ext cx="7188199" cy="2875280"/>
+          </a:xfrm>
+          <a:prstGeom prst="rect">
+            <a:avLst/>
+          </a:prstGeom>
+        </p:spPr>
+      </p:pic>
+      <p:sp>
+        <p:nvSpPr>
+          <p:cNvPr id="6" name="מציין מיקום תוכן 5">
+            <a:extLst>
+              <a:ext uri="{FF2B5EF4-FFF2-40B4-BE49-F238E27FC236}">
+                <a16:creationId xmlns:a16="http://schemas.microsoft.com/office/drawing/2014/main" id="{104B5DAA-7E69-44CB-8833-37C9A574976A}"/>
+              </a:ext>
+            </a:extLst>
+          </p:cNvPr>
+          <p:cNvSpPr>
+            <a:spLocks noGrp="1"/>
+          </p:cNvSpPr>
+          <p:nvPr>
+            <p:ph idx="1"/>
+          </p:nvPr>
+        </p:nvSpPr>
+        <p:spPr>
+          <a:xfrm>
+            <a:off x="4038600" y="4884873"/>
+            <a:ext cx="7188199" cy="1292090"/>
+          </a:xfrm>
+        </p:spPr>
+        <p:txBody>
+          <a:bodyPr>
+            <a:normAutofit/>
+          </a:bodyPr>
+          <a:lstStyle/>
+          <a:p>
+            <a:r>
+              <a:rPr lang="he-IL" sz="2400" dirty="0"/>
+              <a:t>פתיחת הקובץ הרצוי בהרשאות כתיבה בלבד</a:t>
+            </a:r>
+            <a:r>
+              <a:rPr lang="en-US" sz="2400" dirty="0"/>
+              <a:t>.</a:t>
+            </a:r>
+          </a:p>
+        </p:txBody>
+      </p:sp>
+    </p:spTree>
+    <p:extLst>
+      <p:ext uri="{BB962C8B-B14F-4D97-AF65-F5344CB8AC3E}">
+        <p14:creationId xmlns:p14="http://schemas.microsoft.com/office/powerpoint/2010/main" val="1965069268"/>
+      </p:ext>
+    </p:extLst>
+  </p:cSld>
+  <p:clrMapOvr>
+    <a:masterClrMapping/>
+  </p:clrMapOvr>
+</p:sld>
+</file>
+
+<file path=ppt/slides/slide9.xml><?xml version="1.0" encoding="utf-8"?>
+<p:sld xmlns:a="http://schemas.openxmlformats.org/drawingml/2006/main" xmlns:r="http://schemas.openxmlformats.org/officeDocument/2006/relationships" xmlns:p="http://schemas.openxmlformats.org/presentationml/2006/main">
+  <p:cSld>
+    <p:bg>
+      <p:bgPr>
+        <a:solidFill>
+          <a:schemeClr val="bg1"/>
+        </a:solidFill>
+        <a:effectLst/>
+      </p:bgPr>
+    </p:bg>
+    <p:spTree>
+      <p:nvGrpSpPr>
+        <p:cNvPr id="1" name=""/>
+        <p:cNvGrpSpPr/>
+        <p:nvPr/>
+      </p:nvGrpSpPr>
+      <p:grpSpPr>
+        <a:xfrm>
+          <a:off x="0" y="0"/>
+          <a:ext cx="0" cy="0"/>
+          <a:chOff x="0" y="0"/>
+          <a:chExt cx="0" cy="0"/>
+        </a:xfrm>
+      </p:grpSpPr>
+      <p:sp>
+        <p:nvSpPr>
+          <p:cNvPr id="9" name="Rectangle 8">
+            <a:extLst>
+              <a:ext uri="{FF2B5EF4-FFF2-40B4-BE49-F238E27FC236}">
+                <a16:creationId xmlns:a16="http://schemas.microsoft.com/office/drawing/2014/main" id="{42A5316D-ED2F-4F89-B4B4-8D9240B1A348}"/>
               </a:ext>
               <a:ext uri="{C183D7F6-B498-43B3-948B-1728B52AA6E4}">
                 <adec:decorative xmlns:adec="http://schemas.microsoft.com/office/drawing/2017/decorative" val="1"/>
@@ -3928,25 +7047,18 @@
         </p:nvSpPr>
         <p:spPr>
           <a:xfrm>
-            <a:off x="477012" y="480060"/>
-            <a:ext cx="11237976" cy="5897880"/>
+            <a:off x="0" y="0"/>
+            <a:ext cx="2013557" cy="6858000"/>
           </a:xfrm>
           <a:prstGeom prst="rect">
             <a:avLst/>
           </a:prstGeom>
           <a:solidFill>
-            <a:srgbClr val="FFFFFF"/>
+            <a:srgbClr val="4E5E61"/>
           </a:solidFill>
-          <a:ln w="9525">
+          <a:ln>
             <a:noFill/>
           </a:ln>
-          <a:effectLst>
-            <a:outerShdw blurRad="63500" dist="17780" dir="5400000" algn="t" rotWithShape="0">
-              <a:prstClr val="black">
-                <a:alpha val="43000"/>
-              </a:prstClr>
-            </a:outerShdw>
-          </a:effectLst>
         </p:spPr>
         <p:style>
           <a:lnRef idx="2">
@@ -3968,47 +7080,118 @@
           <a:bodyPr rtlCol="0" anchor="ctr"/>
           <a:lstStyle/>
           <a:p>
-            <a:pPr algn="ctr"/>
-            <a:endParaRPr lang="en-US"/>
+            <a:pPr marL="0" marR="0" lvl="0" indent="0" algn="ctr" defTabSz="914400" rtl="0" eaLnBrk="1" fontAlgn="auto" latinLnBrk="0" hangingPunct="1">
+              <a:lnSpc>
+                <a:spcPct val="100000"/>
+              </a:lnSpc>
+              <a:spcBef>
+                <a:spcPts val="0"/>
+              </a:spcBef>
+              <a:spcAft>
+                <a:spcPts val="0"/>
+              </a:spcAft>
+              <a:buClrTx/>
+              <a:buSzTx/>
+              <a:buFontTx/>
+              <a:buNone/>
+              <a:tabLst/>
+              <a:defRPr/>
+            </a:pPr>
+            <a:endParaRPr kumimoji="0" lang="en-US" sz="1800" b="0" i="0" u="none" strike="noStrike" kern="1200" cap="none" spc="0" normalizeH="0" baseline="0" noProof="0">
+              <a:ln>
+                <a:noFill/>
+              </a:ln>
+              <a:solidFill>
+                <a:prstClr val="white"/>
+              </a:solidFill>
+              <a:effectLst/>
+              <a:uLnTx/>
+              <a:uFillTx/>
+              <a:latin typeface="Calibri" panose="020F0502020204030204"/>
+              <a:ea typeface="+mn-ea"/>
+              <a:cs typeface="+mn-cs"/>
+            </a:endParaRPr>
           </a:p>
         </p:txBody>
       </p:sp>
       <p:pic>
         <p:nvPicPr>
-          <p:cNvPr id="7" name="תמונה 3">
-            <a:extLst>
-              <a:ext uri="{FF2B5EF4-FFF2-40B4-BE49-F238E27FC236}">
-                <a16:creationId xmlns:a16="http://schemas.microsoft.com/office/drawing/2014/main" id="{B345C2C4-C5E6-488A-99E2-934927C075A1}"/>
+          <p:cNvPr id="4" name="תמונה 3">
+            <a:extLst>
+              <a:ext uri="{FF2B5EF4-FFF2-40B4-BE49-F238E27FC236}">
+                <a16:creationId xmlns:a16="http://schemas.microsoft.com/office/drawing/2014/main" id="{6358469F-361D-4A54-B4F2-2981C42620AA}"/>
               </a:ext>
             </a:extLst>
           </p:cNvPr>
           <p:cNvPicPr>
-            <a:picLocks noGrp="1"/>
+            <a:picLocks noChangeAspect="1"/>
           </p:cNvPicPr>
-          <p:nvPr>
-            <p:ph idx="1"/>
-          </p:nvPr>
+          <p:nvPr/>
         </p:nvPicPr>
         <p:blipFill>
-          <a:blip r:embed="rId2"/>
+          <a:blip r:embed="rId3"/>
           <a:stretch>
             <a:fillRect/>
           </a:stretch>
         </p:blipFill>
         <p:spPr>
           <a:xfrm>
-            <a:off x="2948505" y="643467"/>
-            <a:ext cx="6294989" cy="5571066"/>
+            <a:off x="6194972" y="1313299"/>
+            <a:ext cx="5031827" cy="3091146"/>
           </a:xfrm>
           <a:prstGeom prst="rect">
             <a:avLst/>
           </a:prstGeom>
         </p:spPr>
       </p:pic>
+      <p:sp>
+        <p:nvSpPr>
+          <p:cNvPr id="3" name="מציין מיקום תוכן 2">
+            <a:extLst>
+              <a:ext uri="{FF2B5EF4-FFF2-40B4-BE49-F238E27FC236}">
+                <a16:creationId xmlns:a16="http://schemas.microsoft.com/office/drawing/2014/main" id="{E72E7508-64F9-45B2-809B-848D2CDB68A5}"/>
+              </a:ext>
+            </a:extLst>
+          </p:cNvPr>
+          <p:cNvSpPr>
+            <a:spLocks noGrp="1"/>
+          </p:cNvSpPr>
+          <p:nvPr>
+            <p:ph idx="1"/>
+          </p:nvPr>
+        </p:nvSpPr>
+        <p:spPr>
+          <a:xfrm>
+            <a:off x="4038600" y="4884873"/>
+            <a:ext cx="7188199" cy="1292090"/>
+          </a:xfrm>
+        </p:spPr>
+        <p:txBody>
+          <a:bodyPr>
+            <a:normAutofit/>
+          </a:bodyPr>
+          <a:lstStyle/>
+          <a:p>
+            <a:r>
+              <a:rPr lang="he-IL" sz="2400" dirty="0"/>
+              <a:t>מיפוי הקובץ לזיכרון הווירטואלי עם הדגל </a:t>
+            </a:r>
+            <a:r>
+              <a:rPr lang="en-US" sz="2400" dirty="0"/>
+              <a:t>MAP_PRIVATE</a:t>
+            </a:r>
+            <a:r>
+              <a:rPr lang="he-IL" sz="2400" dirty="0"/>
+              <a:t>.</a:t>
+            </a:r>
+            <a:endParaRPr lang="en-US" sz="2400" dirty="0"/>
+          </a:p>
+        </p:txBody>
+      </p:sp>
     </p:spTree>
     <p:extLst>
       <p:ext uri="{BB962C8B-B14F-4D97-AF65-F5344CB8AC3E}">
-        <p14:creationId xmlns:p14="http://schemas.microsoft.com/office/powerpoint/2010/main" val="2544582434"/>
+        <p14:creationId xmlns:p14="http://schemas.microsoft.com/office/powerpoint/2010/main" val="3465557920"/>
       </p:ext>
     </p:extLst>
   </p:cSld>
@@ -4311,4 +7494,299 @@
     </a:ext>
   </a:extLst>
 </a:theme>
+</file>
+
+<file path=ppt/theme/theme2.xml><?xml version="1.0" encoding="utf-8"?>
+<a:theme xmlns:a="http://schemas.openxmlformats.org/drawingml/2006/main" name="ערכת נושא Office">
+  <a:themeElements>
+    <a:clrScheme name="Office">
+      <a:dk1>
+        <a:sysClr val="windowText" lastClr="000000"/>
+      </a:dk1>
+      <a:lt1>
+        <a:sysClr val="window" lastClr="FFFFFF"/>
+      </a:lt1>
+      <a:dk2>
+        <a:srgbClr val="44546A"/>
+      </a:dk2>
+      <a:lt2>
+        <a:srgbClr val="E7E6E6"/>
+      </a:lt2>
+      <a:accent1>
+        <a:srgbClr val="4472C4"/>
+      </a:accent1>
+      <a:accent2>
+        <a:srgbClr val="ED7D31"/>
+      </a:accent2>
+      <a:accent3>
+        <a:srgbClr val="A5A5A5"/>
+      </a:accent3>
+      <a:accent4>
+        <a:srgbClr val="FFC000"/>
+      </a:accent4>
+      <a:accent5>
+        <a:srgbClr val="5B9BD5"/>
+      </a:accent5>
+      <a:accent6>
+        <a:srgbClr val="70AD47"/>
+      </a:accent6>
+      <a:hlink>
+        <a:srgbClr val="0563C1"/>
+      </a:hlink>
+      <a:folHlink>
+        <a:srgbClr val="954F72"/>
+      </a:folHlink>
+    </a:clrScheme>
+    <a:fontScheme name="Office">
+      <a:majorFont>
+        <a:latin typeface="Calibri Light" panose="020F0302020204030204"/>
+        <a:ea typeface=""/>
+        <a:cs typeface=""/>
+        <a:font script="Jpan" typeface="游ゴシック Light"/>
+        <a:font script="Hang" typeface="맑은 고딕"/>
+        <a:font script="Hans" typeface="等线 Light"/>
+        <a:font script="Hant" typeface="新細明體"/>
+        <a:font script="Arab" typeface="Times New Roman"/>
+        <a:font script="Hebr" typeface="Times New Roman"/>
+        <a:font script="Thai" typeface="Angsana New"/>
+        <a:font script="Ethi" typeface="Nyala"/>
+        <a:font script="Beng" typeface="Vrinda"/>
+        <a:font script="Gujr" typeface="Shruti"/>
+        <a:font script="Khmr" typeface="MoolBoran"/>
+        <a:font script="Knda" typeface="Tunga"/>
+        <a:font script="Guru" typeface="Raavi"/>
+        <a:font script="Cans" typeface="Euphemia"/>
+        <a:font script="Cher" typeface="Plantagenet Cherokee"/>
+        <a:font script="Yiii" typeface="Microsoft Yi Baiti"/>
+        <a:font script="Tibt" typeface="Microsoft Himalaya"/>
+        <a:font script="Thaa" typeface="MV Boli"/>
+        <a:font script="Deva" typeface="Mangal"/>
+        <a:font script="Telu" typeface="Gautami"/>
+        <a:font script="Taml" typeface="Latha"/>
+        <a:font script="Syrc" typeface="Estrangelo Edessa"/>
+        <a:font script="Orya" typeface="Kalinga"/>
+        <a:font script="Mlym" typeface="Kartika"/>
+        <a:font script="Laoo" typeface="DokChampa"/>
+        <a:font script="Sinh" typeface="Iskoola Pota"/>
+        <a:font script="Mong" typeface="Mongolian Baiti"/>
+        <a:font script="Viet" typeface="Times New Roman"/>
+        <a:font script="Uigh" typeface="Microsoft Uighur"/>
+        <a:font script="Geor" typeface="Sylfaen"/>
+        <a:font script="Armn" typeface="Arial"/>
+        <a:font script="Bugi" typeface="Leelawadee UI"/>
+        <a:font script="Bopo" typeface="Microsoft JhengHei"/>
+        <a:font script="Java" typeface="Javanese Text"/>
+        <a:font script="Lisu" typeface="Segoe UI"/>
+        <a:font script="Mymr" typeface="Myanmar Text"/>
+        <a:font script="Nkoo" typeface="Ebrima"/>
+        <a:font script="Olck" typeface="Nirmala UI"/>
+        <a:font script="Osma" typeface="Ebrima"/>
+        <a:font script="Phag" typeface="Phagspa"/>
+        <a:font script="Syrn" typeface="Estrangelo Edessa"/>
+        <a:font script="Syrj" typeface="Estrangelo Edessa"/>
+        <a:font script="Syre" typeface="Estrangelo Edessa"/>
+        <a:font script="Sora" typeface="Nirmala UI"/>
+        <a:font script="Tale" typeface="Microsoft Tai Le"/>
+        <a:font script="Talu" typeface="Microsoft New Tai Lue"/>
+        <a:font script="Tfng" typeface="Ebrima"/>
+      </a:majorFont>
+      <a:minorFont>
+        <a:latin typeface="Calibri" panose="020F0502020204030204"/>
+        <a:ea typeface=""/>
+        <a:cs typeface=""/>
+        <a:font script="Jpan" typeface="游ゴシック"/>
+        <a:font script="Hang" typeface="맑은 고딕"/>
+        <a:font script="Hans" typeface="等线"/>
+        <a:font script="Hant" typeface="新細明體"/>
+        <a:font script="Arab" typeface="Arial"/>
+        <a:font script="Hebr" typeface="Arial"/>
+        <a:font script="Thai" typeface="Cordia New"/>
+        <a:font script="Ethi" typeface="Nyala"/>
+        <a:font script="Beng" typeface="Vrinda"/>
+        <a:font script="Gujr" typeface="Shruti"/>
+        <a:font script="Khmr" typeface="DaunPenh"/>
+        <a:font script="Knda" typeface="Tunga"/>
+        <a:font script="Guru" typeface="Raavi"/>
+        <a:font script="Cans" typeface="Euphemia"/>
+        <a:font script="Cher" typeface="Plantagenet Cherokee"/>
+        <a:font script="Yiii" typeface="Microsoft Yi Baiti"/>
+        <a:font script="Tibt" typeface="Microsoft Himalaya"/>
+        <a:font script="Thaa" typeface="MV Boli"/>
+        <a:font script="Deva" typeface="Mangal"/>
+        <a:font script="Telu" typeface="Gautami"/>
+        <a:font script="Taml" typeface="Latha"/>
+        <a:font script="Syrc" typeface="Estrangelo Edessa"/>
+        <a:font script="Orya" typeface="Kalinga"/>
+        <a:font script="Mlym" typeface="Kartika"/>
+        <a:font script="Laoo" typeface="DokChampa"/>
+        <a:font script="Sinh" typeface="Iskoola Pota"/>
+        <a:font script="Mong" typeface="Mongolian Baiti"/>
+        <a:font script="Viet" typeface="Arial"/>
+        <a:font script="Uigh" typeface="Microsoft Uighur"/>
+        <a:font script="Geor" typeface="Sylfaen"/>
+        <a:font script="Armn" typeface="Arial"/>
+        <a:font script="Bugi" typeface="Leelawadee UI"/>
+        <a:font script="Bopo" typeface="Microsoft JhengHei"/>
+        <a:font script="Java" typeface="Javanese Text"/>
+        <a:font script="Lisu" typeface="Segoe UI"/>
+        <a:font script="Mymr" typeface="Myanmar Text"/>
+        <a:font script="Nkoo" typeface="Ebrima"/>
+        <a:font script="Olck" typeface="Nirmala UI"/>
+        <a:font script="Osma" typeface="Ebrima"/>
+        <a:font script="Phag" typeface="Phagspa"/>
+        <a:font script="Syrn" typeface="Estrangelo Edessa"/>
+        <a:font script="Syrj" typeface="Estrangelo Edessa"/>
+        <a:font script="Syre" typeface="Estrangelo Edessa"/>
+        <a:font script="Sora" typeface="Nirmala UI"/>
+        <a:font script="Tale" typeface="Microsoft Tai Le"/>
+        <a:font script="Talu" typeface="Microsoft New Tai Lue"/>
+        <a:font script="Tfng" typeface="Ebrima"/>
+      </a:minorFont>
+    </a:fontScheme>
+    <a:fmtScheme name="Office">
+      <a:fillStyleLst>
+        <a:solidFill>
+          <a:schemeClr val="phClr"/>
+        </a:solidFill>
+        <a:gradFill rotWithShape="1">
+          <a:gsLst>
+            <a:gs pos="0">
+              <a:schemeClr val="phClr">
+                <a:lumMod val="110000"/>
+                <a:satMod val="105000"/>
+                <a:tint val="67000"/>
+              </a:schemeClr>
+            </a:gs>
+            <a:gs pos="50000">
+              <a:schemeClr val="phClr">
+                <a:lumMod val="105000"/>
+                <a:satMod val="103000"/>
+                <a:tint val="73000"/>
+              </a:schemeClr>
+            </a:gs>
+            <a:gs pos="100000">
+              <a:schemeClr val="phClr">
+                <a:lumMod val="105000"/>
+                <a:satMod val="109000"/>
+                <a:tint val="81000"/>
+              </a:schemeClr>
+            </a:gs>
+          </a:gsLst>
+          <a:lin ang="5400000" scaled="0"/>
+        </a:gradFill>
+        <a:gradFill rotWithShape="1">
+          <a:gsLst>
+            <a:gs pos="0">
+              <a:schemeClr val="phClr">
+                <a:satMod val="103000"/>
+                <a:lumMod val="102000"/>
+                <a:tint val="94000"/>
+              </a:schemeClr>
+            </a:gs>
+            <a:gs pos="50000">
+              <a:schemeClr val="phClr">
+                <a:satMod val="110000"/>
+                <a:lumMod val="100000"/>
+                <a:shade val="100000"/>
+              </a:schemeClr>
+            </a:gs>
+            <a:gs pos="100000">
+              <a:schemeClr val="phClr">
+                <a:lumMod val="99000"/>
+                <a:satMod val="120000"/>
+                <a:shade val="78000"/>
+              </a:schemeClr>
+            </a:gs>
+          </a:gsLst>
+          <a:lin ang="5400000" scaled="0"/>
+        </a:gradFill>
+      </a:fillStyleLst>
+      <a:lnStyleLst>
+        <a:ln w="6350" cap="flat" cmpd="sng" algn="ctr">
+          <a:solidFill>
+            <a:schemeClr val="phClr"/>
+          </a:solidFill>
+          <a:prstDash val="solid"/>
+          <a:miter lim="800000"/>
+        </a:ln>
+        <a:ln w="12700" cap="flat" cmpd="sng" algn="ctr">
+          <a:solidFill>
+            <a:schemeClr val="phClr"/>
+          </a:solidFill>
+          <a:prstDash val="solid"/>
+          <a:miter lim="800000"/>
+        </a:ln>
+        <a:ln w="19050" cap="flat" cmpd="sng" algn="ctr">
+          <a:solidFill>
+            <a:schemeClr val="phClr"/>
+          </a:solidFill>
+          <a:prstDash val="solid"/>
+          <a:miter lim="800000"/>
+        </a:ln>
+      </a:lnStyleLst>
+      <a:effectStyleLst>
+        <a:effectStyle>
+          <a:effectLst/>
+        </a:effectStyle>
+        <a:effectStyle>
+          <a:effectLst/>
+        </a:effectStyle>
+        <a:effectStyle>
+          <a:effectLst>
+            <a:outerShdw blurRad="57150" dist="19050" dir="5400000" algn="ctr" rotWithShape="0">
+              <a:srgbClr val="000000">
+                <a:alpha val="63000"/>
+              </a:srgbClr>
+            </a:outerShdw>
+          </a:effectLst>
+        </a:effectStyle>
+      </a:effectStyleLst>
+      <a:bgFillStyleLst>
+        <a:solidFill>
+          <a:schemeClr val="phClr"/>
+        </a:solidFill>
+        <a:solidFill>
+          <a:schemeClr val="phClr">
+            <a:tint val="95000"/>
+            <a:satMod val="170000"/>
+          </a:schemeClr>
+        </a:solidFill>
+        <a:gradFill rotWithShape="1">
+          <a:gsLst>
+            <a:gs pos="0">
+              <a:schemeClr val="phClr">
+                <a:tint val="93000"/>
+                <a:satMod val="150000"/>
+                <a:shade val="98000"/>
+                <a:lumMod val="102000"/>
+              </a:schemeClr>
+            </a:gs>
+            <a:gs pos="50000">
+              <a:schemeClr val="phClr">
+                <a:tint val="98000"/>
+                <a:satMod val="130000"/>
+                <a:shade val="90000"/>
+                <a:lumMod val="103000"/>
+              </a:schemeClr>
+            </a:gs>
+            <a:gs pos="100000">
+              <a:schemeClr val="phClr">
+                <a:shade val="63000"/>
+                <a:satMod val="120000"/>
+              </a:schemeClr>
+            </a:gs>
+          </a:gsLst>
+          <a:lin ang="5400000" scaled="0"/>
+        </a:gradFill>
+      </a:bgFillStyleLst>
+    </a:fmtScheme>
+  </a:themeElements>
+  <a:objectDefaults/>
+  <a:extraClrSchemeLst/>
+  <a:extLst>
+    <a:ext uri="{05A4C25C-085E-4340-85A3-A5531E510DB2}">
+      <thm15:themeFamily xmlns:thm15="http://schemas.microsoft.com/office/thememl/2012/main" name="Office Theme" id="{62F939B6-93AF-4DB8-9C6B-D6C7DFDC589F}" vid="{4A3C46E8-61CC-4603-A589-7422A47A8E4A}"/>
+    </a:ext>
+  </a:extLst>
+</a:theme>
 </file>
</xml_diff>